<commit_message>
Projekts pabeigts, pievienoti pareizie jautājumi un atbildes
</commit_message>
<xml_diff>
--- a/Materiāls un diagrammas/TekstaDatnes_Lukass.pptx
+++ b/Materiāls un diagrammas/TekstaDatnes_Lukass.pptx
@@ -25,20 +25,22 @@
     <p:sldId id="270" r:id="rId19"/>
     <p:sldId id="271" r:id="rId20"/>
     <p:sldId id="272" r:id="rId21"/>
+    <p:sldId id="273" r:id="rId22"/>
+    <p:sldId id="274" r:id="rId23"/>
   </p:sldIdLst>
   <p:sldSz cy="5143500" cx="9144000"/>
   <p:notesSz cx="6858000" cy="9144000"/>
   <p:embeddedFontLst>
     <p:embeddedFont>
       <p:font typeface="Bebas Neue"/>
-      <p:regular r:id="rId22"/>
+      <p:regular r:id="rId24"/>
     </p:embeddedFont>
     <p:embeddedFont>
       <p:font typeface="Albert Sans"/>
-      <p:regular r:id="rId23"/>
-      <p:bold r:id="rId24"/>
-      <p:italic r:id="rId25"/>
-      <p:boldItalic r:id="rId26"/>
+      <p:regular r:id="rId25"/>
+      <p:bold r:id="rId26"/>
+      <p:italic r:id="rId27"/>
+      <p:boldItalic r:id="rId28"/>
     </p:embeddedFont>
   </p:embeddedFontLst>
   <p:defaultTextStyle>
@@ -803,7 +805,7 @@
   <p:cSld>
     <p:spTree>
       <p:nvGrpSpPr>
-        <p:cNvPr id="293" name="Shape 293"/>
+        <p:cNvPr id="288" name="Shape 288"/>
         <p:cNvGrpSpPr/>
         <p:nvPr/>
       </p:nvGrpSpPr>
@@ -817,7 +819,7 @@
       </p:grpSpPr>
       <p:sp>
         <p:nvSpPr>
-          <p:cNvPr id="294" name="Google Shape;294;g25153c47858_0_63:notes"/>
+          <p:cNvPr id="289" name="Google Shape;289;g25153c47858_0_46:notes"/>
           <p:cNvSpPr/>
           <p:nvPr>
             <p:ph idx="2" type="sldImg"/>
@@ -852,7 +854,7 @@
       </p:sp>
       <p:sp>
         <p:nvSpPr>
-          <p:cNvPr id="295" name="Google Shape;295;g25153c47858_0_63:notes"/>
+          <p:cNvPr id="290" name="Google Shape;290;g25153c47858_0_46:notes"/>
           <p:cNvSpPr txBox="1"/>
           <p:nvPr>
             <p:ph idx="1" type="body"/>
@@ -902,7 +904,7 @@
   <p:cSld>
     <p:spTree>
       <p:nvGrpSpPr>
-        <p:cNvPr id="302" name="Shape 302"/>
+        <p:cNvPr id="294" name="Shape 294"/>
         <p:cNvGrpSpPr/>
         <p:nvPr/>
       </p:nvGrpSpPr>
@@ -916,7 +918,7 @@
       </p:grpSpPr>
       <p:sp>
         <p:nvSpPr>
-          <p:cNvPr id="303" name="Google Shape;303;g25153c47858_0_80:notes"/>
+          <p:cNvPr id="295" name="Google Shape;295;g25153c47858_0_52:notes"/>
           <p:cNvSpPr/>
           <p:nvPr>
             <p:ph idx="2" type="sldImg"/>
@@ -951,7 +953,7 @@
       </p:sp>
       <p:sp>
         <p:nvSpPr>
-          <p:cNvPr id="304" name="Google Shape;304;g25153c47858_0_80:notes"/>
+          <p:cNvPr id="296" name="Google Shape;296;g25153c47858_0_52:notes"/>
           <p:cNvSpPr txBox="1"/>
           <p:nvPr>
             <p:ph idx="1" type="body"/>
@@ -1001,7 +1003,7 @@
   <p:cSld>
     <p:spTree>
       <p:nvGrpSpPr>
-        <p:cNvPr id="309" name="Shape 309"/>
+        <p:cNvPr id="304" name="Shape 304"/>
         <p:cNvGrpSpPr/>
         <p:nvPr/>
       </p:nvGrpSpPr>
@@ -1015,7 +1017,7 @@
       </p:grpSpPr>
       <p:sp>
         <p:nvSpPr>
-          <p:cNvPr id="310" name="Google Shape;310;g25153c47858_0_85:notes"/>
+          <p:cNvPr id="305" name="Google Shape;305;g25153c47858_0_63:notes"/>
           <p:cNvSpPr/>
           <p:nvPr>
             <p:ph idx="2" type="sldImg"/>
@@ -1050,7 +1052,7 @@
       </p:sp>
       <p:sp>
         <p:nvSpPr>
-          <p:cNvPr id="311" name="Google Shape;311;g25153c47858_0_85:notes"/>
+          <p:cNvPr id="306" name="Google Shape;306;g25153c47858_0_63:notes"/>
           <p:cNvSpPr txBox="1"/>
           <p:nvPr>
             <p:ph idx="1" type="body"/>
@@ -1100,7 +1102,7 @@
   <p:cSld>
     <p:spTree>
       <p:nvGrpSpPr>
-        <p:cNvPr id="318" name="Shape 318"/>
+        <p:cNvPr id="313" name="Shape 313"/>
         <p:cNvGrpSpPr/>
         <p:nvPr/>
       </p:nvGrpSpPr>
@@ -1114,7 +1116,7 @@
       </p:grpSpPr>
       <p:sp>
         <p:nvSpPr>
-          <p:cNvPr id="319" name="Google Shape;319;g25153c47858_0_97:notes"/>
+          <p:cNvPr id="314" name="Google Shape;314;g25153c47858_0_80:notes"/>
           <p:cNvSpPr/>
           <p:nvPr>
             <p:ph idx="2" type="sldImg"/>
@@ -1149,7 +1151,7 @@
       </p:sp>
       <p:sp>
         <p:nvSpPr>
-          <p:cNvPr id="320" name="Google Shape;320;g25153c47858_0_97:notes"/>
+          <p:cNvPr id="315" name="Google Shape;315;g25153c47858_0_80:notes"/>
           <p:cNvSpPr txBox="1"/>
           <p:nvPr>
             <p:ph idx="1" type="body"/>
@@ -1199,7 +1201,7 @@
   <p:cSld>
     <p:spTree>
       <p:nvGrpSpPr>
-        <p:cNvPr id="325" name="Shape 325"/>
+        <p:cNvPr id="320" name="Shape 320"/>
         <p:cNvGrpSpPr/>
         <p:nvPr/>
       </p:nvGrpSpPr>
@@ -1213,7 +1215,7 @@
       </p:grpSpPr>
       <p:sp>
         <p:nvSpPr>
-          <p:cNvPr id="326" name="Google Shape;326;g25153c47858_0_103:notes"/>
+          <p:cNvPr id="321" name="Google Shape;321;g25153c47858_0_85:notes"/>
           <p:cNvSpPr/>
           <p:nvPr>
             <p:ph idx="2" type="sldImg"/>
@@ -1248,7 +1250,7 @@
       </p:sp>
       <p:sp>
         <p:nvSpPr>
-          <p:cNvPr id="327" name="Google Shape;327;g25153c47858_0_103:notes"/>
+          <p:cNvPr id="322" name="Google Shape;322;g25153c47858_0_85:notes"/>
           <p:cNvSpPr txBox="1"/>
           <p:nvPr>
             <p:ph idx="1" type="body"/>
@@ -1298,7 +1300,7 @@
   <p:cSld>
     <p:spTree>
       <p:nvGrpSpPr>
-        <p:cNvPr id="334" name="Shape 334"/>
+        <p:cNvPr id="329" name="Shape 329"/>
         <p:cNvGrpSpPr/>
         <p:nvPr/>
       </p:nvGrpSpPr>
@@ -1312,7 +1314,7 @@
       </p:grpSpPr>
       <p:sp>
         <p:nvSpPr>
-          <p:cNvPr id="335" name="Google Shape;335;g251bf6fe497_0_0:notes"/>
+          <p:cNvPr id="330" name="Google Shape;330;g25153c47858_0_97:notes"/>
           <p:cNvSpPr/>
           <p:nvPr>
             <p:ph idx="2" type="sldImg"/>
@@ -1347,7 +1349,7 @@
       </p:sp>
       <p:sp>
         <p:nvSpPr>
-          <p:cNvPr id="336" name="Google Shape;336;g251bf6fe497_0_0:notes"/>
+          <p:cNvPr id="331" name="Google Shape;331;g25153c47858_0_97:notes"/>
           <p:cNvSpPr txBox="1"/>
           <p:nvPr>
             <p:ph idx="1" type="body"/>
@@ -1397,7 +1399,7 @@
   <p:cSld>
     <p:spTree>
       <p:nvGrpSpPr>
-        <p:cNvPr id="340" name="Shape 340"/>
+        <p:cNvPr id="336" name="Shape 336"/>
         <p:cNvGrpSpPr/>
         <p:nvPr/>
       </p:nvGrpSpPr>
@@ -1411,7 +1413,7 @@
       </p:grpSpPr>
       <p:sp>
         <p:nvSpPr>
-          <p:cNvPr id="341" name="Google Shape;341;g251bf6fe497_0_6:notes"/>
+          <p:cNvPr id="337" name="Google Shape;337;g25153c47858_0_103:notes"/>
           <p:cNvSpPr/>
           <p:nvPr>
             <p:ph idx="2" type="sldImg"/>
@@ -1446,7 +1448,7 @@
       </p:sp>
       <p:sp>
         <p:nvSpPr>
-          <p:cNvPr id="342" name="Google Shape;342;g251bf6fe497_0_6:notes"/>
+          <p:cNvPr id="338" name="Google Shape;338;g25153c47858_0_103:notes"/>
           <p:cNvSpPr txBox="1"/>
           <p:nvPr>
             <p:ph idx="1" type="body"/>
@@ -1510,7 +1512,7 @@
       </p:grpSpPr>
       <p:sp>
         <p:nvSpPr>
-          <p:cNvPr id="346" name="Google Shape;346;g251bf6fe497_0_10:notes"/>
+          <p:cNvPr id="346" name="Google Shape;346;g251bf6fe497_0_0:notes"/>
           <p:cNvSpPr/>
           <p:nvPr>
             <p:ph idx="2" type="sldImg"/>
@@ -1545,7 +1547,205 @@
       </p:sp>
       <p:sp>
         <p:nvSpPr>
-          <p:cNvPr id="347" name="Google Shape;347;g251bf6fe497_0_10:notes"/>
+          <p:cNvPr id="347" name="Google Shape;347;g251bf6fe497_0_0:notes"/>
+          <p:cNvSpPr txBox="1"/>
+          <p:nvPr>
+            <p:ph idx="1" type="body"/>
+          </p:nvPr>
+        </p:nvSpPr>
+        <p:spPr>
+          <a:xfrm>
+            <a:off x="685800" y="4343400"/>
+            <a:ext cx="5486400" cy="4114800"/>
+          </a:xfrm>
+          <a:prstGeom prst="rect">
+            <a:avLst/>
+          </a:prstGeom>
+        </p:spPr>
+        <p:txBody>
+          <a:bodyPr anchorCtr="0" anchor="t" bIns="91425" lIns="91425" spcFirstLastPara="1" rIns="91425" wrap="square" tIns="91425">
+            <a:noAutofit/>
+          </a:bodyPr>
+          <a:lstStyle/>
+          <a:p>
+            <a:pPr indent="0" lvl="0" marL="0" rtl="0" algn="l">
+              <a:spcBef>
+                <a:spcPts val="0"/>
+              </a:spcBef>
+              <a:spcAft>
+                <a:spcPts val="0"/>
+              </a:spcAft>
+              <a:buNone/>
+            </a:pPr>
+            <a:r>
+              <a:t/>
+            </a:r>
+            <a:endParaRPr/>
+          </a:p>
+        </p:txBody>
+      </p:sp>
+    </p:spTree>
+  </p:cSld>
+  <p:clrMapOvr>
+    <a:masterClrMapping/>
+  </p:clrMapOvr>
+</p:notes>
+</file>
+
+<file path=ppt/notesSlides/notesSlide18.xml><?xml version="1.0" encoding="utf-8"?>
+<p:notes xmlns:a="http://schemas.openxmlformats.org/drawingml/2006/main" xmlns:r="http://schemas.openxmlformats.org/officeDocument/2006/relationships" xmlns:mc="http://schemas.openxmlformats.org/markup-compatibility/2006" xmlns:mv="urn:schemas-microsoft-com:mac:vml" xmlns:p="http://schemas.openxmlformats.org/presentationml/2006/main" xmlns:c="http://schemas.openxmlformats.org/drawingml/2006/chart" xmlns:dgm="http://schemas.openxmlformats.org/drawingml/2006/diagram" xmlns:o="urn:schemas-microsoft-com:office:office" xmlns:v="urn:schemas-microsoft-com:vml" xmlns:pvml="urn:schemas-microsoft-com:office:powerpoint" xmlns:com="http://schemas.openxmlformats.org/drawingml/2006/compatibility" xmlns:p14="http://schemas.microsoft.com/office/powerpoint/2010/main" xmlns:p15="http://schemas.microsoft.com/office/powerpoint/2012/main" xmlns:ahyp="http://schemas.microsoft.com/office/drawing/2018/hyperlinkcolor" showMasterPhAnim="0" showMasterSp="0">
+  <p:cSld>
+    <p:spTree>
+      <p:nvGrpSpPr>
+        <p:cNvPr id="351" name="Shape 351"/>
+        <p:cNvGrpSpPr/>
+        <p:nvPr/>
+      </p:nvGrpSpPr>
+      <p:grpSpPr>
+        <a:xfrm>
+          <a:off x="0" y="0"/>
+          <a:ext cx="0" cy="0"/>
+          <a:chOff x="0" y="0"/>
+          <a:chExt cx="0" cy="0"/>
+        </a:xfrm>
+      </p:grpSpPr>
+      <p:sp>
+        <p:nvSpPr>
+          <p:cNvPr id="352" name="Google Shape;352;g251bf6fe497_0_6:notes"/>
+          <p:cNvSpPr/>
+          <p:nvPr>
+            <p:ph idx="2" type="sldImg"/>
+          </p:nvPr>
+        </p:nvSpPr>
+        <p:spPr>
+          <a:xfrm>
+            <a:off x="381300" y="685800"/>
+            <a:ext cx="6096000" cy="3429000"/>
+          </a:xfrm>
+          <a:custGeom>
+            <a:rect b="b" l="l" r="r" t="t"/>
+            <a:pathLst>
+              <a:path extrusionOk="0" h="120000" w="120000">
+                <a:moveTo>
+                  <a:pt x="0" y="0"/>
+                </a:moveTo>
+                <a:lnTo>
+                  <a:pt x="120000" y="0"/>
+                </a:lnTo>
+                <a:lnTo>
+                  <a:pt x="120000" y="120000"/>
+                </a:lnTo>
+                <a:lnTo>
+                  <a:pt x="0" y="120000"/>
+                </a:lnTo>
+                <a:close/>
+              </a:path>
+            </a:pathLst>
+          </a:custGeom>
+        </p:spPr>
+      </p:sp>
+      <p:sp>
+        <p:nvSpPr>
+          <p:cNvPr id="353" name="Google Shape;353;g251bf6fe497_0_6:notes"/>
+          <p:cNvSpPr txBox="1"/>
+          <p:nvPr>
+            <p:ph idx="1" type="body"/>
+          </p:nvPr>
+        </p:nvSpPr>
+        <p:spPr>
+          <a:xfrm>
+            <a:off x="685800" y="4343400"/>
+            <a:ext cx="5486400" cy="4114800"/>
+          </a:xfrm>
+          <a:prstGeom prst="rect">
+            <a:avLst/>
+          </a:prstGeom>
+        </p:spPr>
+        <p:txBody>
+          <a:bodyPr anchorCtr="0" anchor="t" bIns="91425" lIns="91425" spcFirstLastPara="1" rIns="91425" wrap="square" tIns="91425">
+            <a:noAutofit/>
+          </a:bodyPr>
+          <a:lstStyle/>
+          <a:p>
+            <a:pPr indent="0" lvl="0" marL="0" rtl="0" algn="l">
+              <a:spcBef>
+                <a:spcPts val="0"/>
+              </a:spcBef>
+              <a:spcAft>
+                <a:spcPts val="0"/>
+              </a:spcAft>
+              <a:buNone/>
+            </a:pPr>
+            <a:r>
+              <a:t/>
+            </a:r>
+            <a:endParaRPr/>
+          </a:p>
+        </p:txBody>
+      </p:sp>
+    </p:spTree>
+  </p:cSld>
+  <p:clrMapOvr>
+    <a:masterClrMapping/>
+  </p:clrMapOvr>
+</p:notes>
+</file>
+
+<file path=ppt/notesSlides/notesSlide19.xml><?xml version="1.0" encoding="utf-8"?>
+<p:notes xmlns:a="http://schemas.openxmlformats.org/drawingml/2006/main" xmlns:r="http://schemas.openxmlformats.org/officeDocument/2006/relationships" xmlns:mc="http://schemas.openxmlformats.org/markup-compatibility/2006" xmlns:mv="urn:schemas-microsoft-com:mac:vml" xmlns:p="http://schemas.openxmlformats.org/presentationml/2006/main" xmlns:c="http://schemas.openxmlformats.org/drawingml/2006/chart" xmlns:dgm="http://schemas.openxmlformats.org/drawingml/2006/diagram" xmlns:o="urn:schemas-microsoft-com:office:office" xmlns:v="urn:schemas-microsoft-com:vml" xmlns:pvml="urn:schemas-microsoft-com:office:powerpoint" xmlns:com="http://schemas.openxmlformats.org/drawingml/2006/compatibility" xmlns:p14="http://schemas.microsoft.com/office/powerpoint/2010/main" xmlns:p15="http://schemas.microsoft.com/office/powerpoint/2012/main" xmlns:ahyp="http://schemas.microsoft.com/office/drawing/2018/hyperlinkcolor" showMasterPhAnim="0" showMasterSp="0">
+  <p:cSld>
+    <p:spTree>
+      <p:nvGrpSpPr>
+        <p:cNvPr id="356" name="Shape 356"/>
+        <p:cNvGrpSpPr/>
+        <p:nvPr/>
+      </p:nvGrpSpPr>
+      <p:grpSpPr>
+        <a:xfrm>
+          <a:off x="0" y="0"/>
+          <a:ext cx="0" cy="0"/>
+          <a:chOff x="0" y="0"/>
+          <a:chExt cx="0" cy="0"/>
+        </a:xfrm>
+      </p:grpSpPr>
+      <p:sp>
+        <p:nvSpPr>
+          <p:cNvPr id="357" name="Google Shape;357;g251bf6fe497_0_10:notes"/>
+          <p:cNvSpPr/>
+          <p:nvPr>
+            <p:ph idx="2" type="sldImg"/>
+          </p:nvPr>
+        </p:nvSpPr>
+        <p:spPr>
+          <a:xfrm>
+            <a:off x="381300" y="685800"/>
+            <a:ext cx="6096000" cy="3429000"/>
+          </a:xfrm>
+          <a:custGeom>
+            <a:rect b="b" l="l" r="r" t="t"/>
+            <a:pathLst>
+              <a:path extrusionOk="0" h="120000" w="120000">
+                <a:moveTo>
+                  <a:pt x="0" y="0"/>
+                </a:moveTo>
+                <a:lnTo>
+                  <a:pt x="120000" y="0"/>
+                </a:lnTo>
+                <a:lnTo>
+                  <a:pt x="120000" y="120000"/>
+                </a:lnTo>
+                <a:lnTo>
+                  <a:pt x="0" y="120000"/>
+                </a:lnTo>
+                <a:close/>
+              </a:path>
+            </a:pathLst>
+          </a:custGeom>
+        </p:spPr>
+      </p:sp>
+      <p:sp>
+        <p:nvSpPr>
+          <p:cNvPr id="358" name="Google Shape;358;g251bf6fe497_0_10:notes"/>
           <p:cNvSpPr txBox="1"/>
           <p:nvPr>
             <p:ph idx="1" type="body"/>
@@ -2005,7 +2205,7 @@
       </p:grpSpPr>
       <p:sp>
         <p:nvSpPr>
-          <p:cNvPr id="261" name="Google Shape;261;g25153c47858_0_30:notes"/>
+          <p:cNvPr id="261" name="Google Shape;261;g252187ad4eb_0_4:notes"/>
           <p:cNvSpPr/>
           <p:nvPr>
             <p:ph idx="2" type="sldImg"/>
@@ -2040,7 +2240,7 @@
       </p:sp>
       <p:sp>
         <p:nvSpPr>
-          <p:cNvPr id="262" name="Google Shape;262;g25153c47858_0_30:notes"/>
+          <p:cNvPr id="262" name="Google Shape;262;g252187ad4eb_0_4:notes"/>
           <p:cNvSpPr txBox="1"/>
           <p:nvPr>
             <p:ph idx="1" type="body"/>
@@ -2090,7 +2290,7 @@
   <p:cSld>
     <p:spTree>
       <p:nvGrpSpPr>
-        <p:cNvPr id="268" name="Shape 268"/>
+        <p:cNvPr id="265" name="Shape 265"/>
         <p:cNvGrpSpPr/>
         <p:nvPr/>
       </p:nvGrpSpPr>
@@ -2104,7 +2304,7 @@
       </p:grpSpPr>
       <p:sp>
         <p:nvSpPr>
-          <p:cNvPr id="269" name="Google Shape;269;g25153c47858_0_37:notes"/>
+          <p:cNvPr id="266" name="Google Shape;266;g252187ad4eb_0_0:notes"/>
           <p:cNvSpPr/>
           <p:nvPr>
             <p:ph idx="2" type="sldImg"/>
@@ -2139,7 +2339,7 @@
       </p:sp>
       <p:sp>
         <p:nvSpPr>
-          <p:cNvPr id="270" name="Google Shape;270;g25153c47858_0_37:notes"/>
+          <p:cNvPr id="267" name="Google Shape;267;g252187ad4eb_0_0:notes"/>
           <p:cNvSpPr txBox="1"/>
           <p:nvPr>
             <p:ph idx="1" type="body"/>
@@ -2189,7 +2389,7 @@
   <p:cSld>
     <p:spTree>
       <p:nvGrpSpPr>
-        <p:cNvPr id="277" name="Shape 277"/>
+        <p:cNvPr id="271" name="Shape 271"/>
         <p:cNvGrpSpPr/>
         <p:nvPr/>
       </p:nvGrpSpPr>
@@ -2203,7 +2403,7 @@
       </p:grpSpPr>
       <p:sp>
         <p:nvSpPr>
-          <p:cNvPr id="278" name="Google Shape;278;g25153c47858_0_46:notes"/>
+          <p:cNvPr id="272" name="Google Shape;272;g25153c47858_0_30:notes"/>
           <p:cNvSpPr/>
           <p:nvPr>
             <p:ph idx="2" type="sldImg"/>
@@ -2238,7 +2438,7 @@
       </p:sp>
       <p:sp>
         <p:nvSpPr>
-          <p:cNvPr id="279" name="Google Shape;279;g25153c47858_0_46:notes"/>
+          <p:cNvPr id="273" name="Google Shape;273;g25153c47858_0_30:notes"/>
           <p:cNvSpPr txBox="1"/>
           <p:nvPr>
             <p:ph idx="1" type="body"/>
@@ -2288,7 +2488,7 @@
   <p:cSld>
     <p:spTree>
       <p:nvGrpSpPr>
-        <p:cNvPr id="283" name="Shape 283"/>
+        <p:cNvPr id="279" name="Shape 279"/>
         <p:cNvGrpSpPr/>
         <p:nvPr/>
       </p:nvGrpSpPr>
@@ -2302,7 +2502,7 @@
       </p:grpSpPr>
       <p:sp>
         <p:nvSpPr>
-          <p:cNvPr id="284" name="Google Shape;284;g25153c47858_0_52:notes"/>
+          <p:cNvPr id="280" name="Google Shape;280;g25153c47858_0_37:notes"/>
           <p:cNvSpPr/>
           <p:nvPr>
             <p:ph idx="2" type="sldImg"/>
@@ -2337,7 +2537,7 @@
       </p:sp>
       <p:sp>
         <p:nvSpPr>
-          <p:cNvPr id="285" name="Google Shape;285;g25153c47858_0_52:notes"/>
+          <p:cNvPr id="281" name="Google Shape;281;g25153c47858_0_37:notes"/>
           <p:cNvSpPr txBox="1"/>
           <p:nvPr>
             <p:ph idx="1" type="body"/>
@@ -27358,7 +27558,7 @@
   <p:cSld>
     <p:spTree>
       <p:nvGrpSpPr>
-        <p:cNvPr id="296" name="Shape 296"/>
+        <p:cNvPr id="291" name="Shape 291"/>
         <p:cNvGrpSpPr/>
         <p:nvPr/>
       </p:nvGrpSpPr>
@@ -27372,7 +27572,7 @@
       </p:grpSpPr>
       <p:sp>
         <p:nvSpPr>
-          <p:cNvPr id="297" name="Google Shape;297;p32"/>
+          <p:cNvPr id="292" name="Google Shape;292;p32"/>
           <p:cNvSpPr txBox="1"/>
           <p:nvPr>
             <p:ph type="title"/>
@@ -27404,6 +27604,364 @@
             </a:pPr>
             <a:r>
               <a:rPr lang="en"/>
+              <a:t>Koda piemērs, kur izmanto ofstream, lai izveidotu failu</a:t>
+            </a:r>
+            <a:endParaRPr/>
+          </a:p>
+        </p:txBody>
+      </p:sp>
+      <p:pic>
+        <p:nvPicPr>
+          <p:cNvPr id="293" name="Google Shape;293;p32"/>
+          <p:cNvPicPr preferRelativeResize="0"/>
+          <p:nvPr/>
+        </p:nvPicPr>
+        <p:blipFill>
+          <a:blip r:embed="rId3">
+            <a:alphaModFix/>
+          </a:blip>
+          <a:stretch>
+            <a:fillRect/>
+          </a:stretch>
+        </p:blipFill>
+        <p:spPr>
+          <a:xfrm>
+            <a:off x="1637250" y="1955050"/>
+            <a:ext cx="5834500" cy="2075950"/>
+          </a:xfrm>
+          <a:prstGeom prst="rect">
+            <a:avLst/>
+          </a:prstGeom>
+          <a:noFill/>
+          <a:ln>
+            <a:noFill/>
+          </a:ln>
+        </p:spPr>
+      </p:pic>
+    </p:spTree>
+  </p:cSld>
+  <p:clrMapOvr>
+    <a:masterClrMapping/>
+  </p:clrMapOvr>
+</p:sld>
+</file>
+
+<file path=ppt/slides/slide11.xml><?xml version="1.0" encoding="utf-8"?>
+<p:sld xmlns:a="http://schemas.openxmlformats.org/drawingml/2006/main" xmlns:r="http://schemas.openxmlformats.org/officeDocument/2006/relationships" xmlns:mc="http://schemas.openxmlformats.org/markup-compatibility/2006" xmlns:mv="urn:schemas-microsoft-com:mac:vml" xmlns:p="http://schemas.openxmlformats.org/presentationml/2006/main" xmlns:c="http://schemas.openxmlformats.org/drawingml/2006/chart" xmlns:dgm="http://schemas.openxmlformats.org/drawingml/2006/diagram" xmlns:o="urn:schemas-microsoft-com:office:office" xmlns:v="urn:schemas-microsoft-com:vml" xmlns:pvml="urn:schemas-microsoft-com:office:powerpoint" xmlns:com="http://schemas.openxmlformats.org/drawingml/2006/compatibility" xmlns:p14="http://schemas.microsoft.com/office/powerpoint/2010/main" xmlns:p15="http://schemas.microsoft.com/office/powerpoint/2012/main" xmlns:ahyp="http://schemas.microsoft.com/office/drawing/2018/hyperlinkcolor">
+  <p:cSld>
+    <p:spTree>
+      <p:nvGrpSpPr>
+        <p:cNvPr id="297" name="Shape 297"/>
+        <p:cNvGrpSpPr/>
+        <p:nvPr/>
+      </p:nvGrpSpPr>
+      <p:grpSpPr>
+        <a:xfrm>
+          <a:off x="0" y="0"/>
+          <a:ext cx="0" cy="0"/>
+          <a:chOff x="0" y="0"/>
+          <a:chExt cx="0" cy="0"/>
+        </a:xfrm>
+      </p:grpSpPr>
+      <p:sp>
+        <p:nvSpPr>
+          <p:cNvPr id="298" name="Google Shape;298;p33"/>
+          <p:cNvSpPr txBox="1"/>
+          <p:nvPr>
+            <p:ph type="title"/>
+          </p:nvPr>
+        </p:nvSpPr>
+        <p:spPr>
+          <a:xfrm>
+            <a:off x="1494150" y="451575"/>
+            <a:ext cx="6155700" cy="664200"/>
+          </a:xfrm>
+          <a:prstGeom prst="rect">
+            <a:avLst/>
+          </a:prstGeom>
+        </p:spPr>
+        <p:txBody>
+          <a:bodyPr anchorCtr="0" anchor="t" bIns="91425" lIns="91425" spcFirstLastPara="1" rIns="91425" wrap="square" tIns="91425">
+            <a:noAutofit/>
+          </a:bodyPr>
+          <a:lstStyle/>
+          <a:p>
+            <a:pPr indent="0" lvl="0" marL="0" rtl="0" algn="l">
+              <a:spcBef>
+                <a:spcPts val="0"/>
+              </a:spcBef>
+              <a:spcAft>
+                <a:spcPts val="0"/>
+              </a:spcAft>
+              <a:buNone/>
+            </a:pPr>
+            <a:r>
+              <a:rPr lang="en"/>
+              <a:t>Kas notika, pēc koda palaišanas</a:t>
+            </a:r>
+            <a:endParaRPr/>
+          </a:p>
+        </p:txBody>
+      </p:sp>
+      <p:sp>
+        <p:nvSpPr>
+          <p:cNvPr id="299" name="Google Shape;299;p33"/>
+          <p:cNvSpPr txBox="1"/>
+          <p:nvPr/>
+        </p:nvSpPr>
+        <p:spPr>
+          <a:xfrm>
+            <a:off x="1696000" y="1195238"/>
+            <a:ext cx="1134300" cy="554100"/>
+          </a:xfrm>
+          <a:prstGeom prst="rect">
+            <a:avLst/>
+          </a:prstGeom>
+          <a:noFill/>
+          <a:ln>
+            <a:noFill/>
+          </a:ln>
+        </p:spPr>
+        <p:txBody>
+          <a:bodyPr anchorCtr="0" anchor="t" bIns="91425" lIns="91425" spcFirstLastPara="1" rIns="91425" wrap="square" tIns="91425">
+            <a:spAutoFit/>
+          </a:bodyPr>
+          <a:lstStyle/>
+          <a:p>
+            <a:pPr indent="0" lvl="0" marL="0" rtl="0" algn="l">
+              <a:spcBef>
+                <a:spcPts val="0"/>
+              </a:spcBef>
+              <a:spcAft>
+                <a:spcPts val="0"/>
+              </a:spcAft>
+              <a:buNone/>
+            </a:pPr>
+            <a:r>
+              <a:rPr lang="en" sz="2400">
+                <a:solidFill>
+                  <a:schemeClr val="dk2"/>
+                </a:solidFill>
+                <a:latin typeface="Albert Sans"/>
+                <a:ea typeface="Albert Sans"/>
+                <a:cs typeface="Albert Sans"/>
+                <a:sym typeface="Albert Sans"/>
+              </a:rPr>
+              <a:t>Pirms:</a:t>
+            </a:r>
+            <a:endParaRPr sz="2400">
+              <a:solidFill>
+                <a:schemeClr val="dk2"/>
+              </a:solidFill>
+              <a:latin typeface="Albert Sans"/>
+              <a:ea typeface="Albert Sans"/>
+              <a:cs typeface="Albert Sans"/>
+              <a:sym typeface="Albert Sans"/>
+            </a:endParaRPr>
+          </a:p>
+        </p:txBody>
+      </p:sp>
+      <p:sp>
+        <p:nvSpPr>
+          <p:cNvPr id="300" name="Google Shape;300;p33"/>
+          <p:cNvSpPr txBox="1"/>
+          <p:nvPr/>
+        </p:nvSpPr>
+        <p:spPr>
+          <a:xfrm>
+            <a:off x="5668175" y="1195250"/>
+            <a:ext cx="811800" cy="554100"/>
+          </a:xfrm>
+          <a:prstGeom prst="rect">
+            <a:avLst/>
+          </a:prstGeom>
+          <a:noFill/>
+          <a:ln>
+            <a:noFill/>
+          </a:ln>
+        </p:spPr>
+        <p:txBody>
+          <a:bodyPr anchorCtr="0" anchor="t" bIns="91425" lIns="91425" spcFirstLastPara="1" rIns="91425" wrap="square" tIns="91425">
+            <a:spAutoFit/>
+          </a:bodyPr>
+          <a:lstStyle/>
+          <a:p>
+            <a:pPr indent="0" lvl="0" marL="0" rtl="0" algn="l">
+              <a:spcBef>
+                <a:spcPts val="0"/>
+              </a:spcBef>
+              <a:spcAft>
+                <a:spcPts val="0"/>
+              </a:spcAft>
+              <a:buNone/>
+            </a:pPr>
+            <a:r>
+              <a:rPr lang="en" sz="2400">
+                <a:solidFill>
+                  <a:schemeClr val="dk2"/>
+                </a:solidFill>
+                <a:latin typeface="Albert Sans"/>
+                <a:ea typeface="Albert Sans"/>
+                <a:cs typeface="Albert Sans"/>
+                <a:sym typeface="Albert Sans"/>
+              </a:rPr>
+              <a:t>Pēc:</a:t>
+            </a:r>
+            <a:endParaRPr sz="2400">
+              <a:solidFill>
+                <a:schemeClr val="dk2"/>
+              </a:solidFill>
+              <a:latin typeface="Albert Sans"/>
+              <a:ea typeface="Albert Sans"/>
+              <a:cs typeface="Albert Sans"/>
+              <a:sym typeface="Albert Sans"/>
+            </a:endParaRPr>
+          </a:p>
+        </p:txBody>
+      </p:sp>
+      <p:pic>
+        <p:nvPicPr>
+          <p:cNvPr id="301" name="Google Shape;301;p33"/>
+          <p:cNvPicPr preferRelativeResize="0"/>
+          <p:nvPr/>
+        </p:nvPicPr>
+        <p:blipFill>
+          <a:blip r:embed="rId3">
+            <a:alphaModFix/>
+          </a:blip>
+          <a:stretch>
+            <a:fillRect/>
+          </a:stretch>
+        </p:blipFill>
+        <p:spPr>
+          <a:xfrm>
+            <a:off x="985000" y="1749356"/>
+            <a:ext cx="2556300" cy="1493550"/>
+          </a:xfrm>
+          <a:prstGeom prst="rect">
+            <a:avLst/>
+          </a:prstGeom>
+          <a:noFill/>
+          <a:ln>
+            <a:noFill/>
+          </a:ln>
+        </p:spPr>
+      </p:pic>
+      <p:pic>
+        <p:nvPicPr>
+          <p:cNvPr id="302" name="Google Shape;302;p33"/>
+          <p:cNvPicPr preferRelativeResize="0"/>
+          <p:nvPr/>
+        </p:nvPicPr>
+        <p:blipFill>
+          <a:blip r:embed="rId4">
+            <a:alphaModFix/>
+          </a:blip>
+          <a:stretch>
+            <a:fillRect/>
+          </a:stretch>
+        </p:blipFill>
+        <p:spPr>
+          <a:xfrm>
+            <a:off x="5068575" y="1749353"/>
+            <a:ext cx="2011000" cy="1493550"/>
+          </a:xfrm>
+          <a:prstGeom prst="rect">
+            <a:avLst/>
+          </a:prstGeom>
+          <a:noFill/>
+          <a:ln>
+            <a:noFill/>
+          </a:ln>
+        </p:spPr>
+      </p:pic>
+      <p:pic>
+        <p:nvPicPr>
+          <p:cNvPr id="303" name="Google Shape;303;p33"/>
+          <p:cNvPicPr preferRelativeResize="0"/>
+          <p:nvPr/>
+        </p:nvPicPr>
+        <p:blipFill>
+          <a:blip r:embed="rId5">
+            <a:alphaModFix/>
+          </a:blip>
+          <a:stretch>
+            <a:fillRect/>
+          </a:stretch>
+        </p:blipFill>
+        <p:spPr>
+          <a:xfrm>
+            <a:off x="4235750" y="3575931"/>
+            <a:ext cx="3676650" cy="504825"/>
+          </a:xfrm>
+          <a:prstGeom prst="rect">
+            <a:avLst/>
+          </a:prstGeom>
+          <a:noFill/>
+          <a:ln>
+            <a:noFill/>
+          </a:ln>
+        </p:spPr>
+      </p:pic>
+    </p:spTree>
+  </p:cSld>
+  <p:clrMapOvr>
+    <a:masterClrMapping/>
+  </p:clrMapOvr>
+</p:sld>
+</file>
+
+<file path=ppt/slides/slide12.xml><?xml version="1.0" encoding="utf-8"?>
+<p:sld xmlns:a="http://schemas.openxmlformats.org/drawingml/2006/main" xmlns:r="http://schemas.openxmlformats.org/officeDocument/2006/relationships" xmlns:mc="http://schemas.openxmlformats.org/markup-compatibility/2006" xmlns:mv="urn:schemas-microsoft-com:mac:vml" xmlns:p="http://schemas.openxmlformats.org/presentationml/2006/main" xmlns:c="http://schemas.openxmlformats.org/drawingml/2006/chart" xmlns:dgm="http://schemas.openxmlformats.org/drawingml/2006/diagram" xmlns:o="urn:schemas-microsoft-com:office:office" xmlns:v="urn:schemas-microsoft-com:vml" xmlns:pvml="urn:schemas-microsoft-com:office:powerpoint" xmlns:com="http://schemas.openxmlformats.org/drawingml/2006/compatibility" xmlns:p14="http://schemas.microsoft.com/office/powerpoint/2010/main" xmlns:p15="http://schemas.microsoft.com/office/powerpoint/2012/main" xmlns:ahyp="http://schemas.microsoft.com/office/drawing/2018/hyperlinkcolor">
+  <p:cSld>
+    <p:spTree>
+      <p:nvGrpSpPr>
+        <p:cNvPr id="307" name="Shape 307"/>
+        <p:cNvGrpSpPr/>
+        <p:nvPr/>
+      </p:nvGrpSpPr>
+      <p:grpSpPr>
+        <a:xfrm>
+          <a:off x="0" y="0"/>
+          <a:ext cx="0" cy="0"/>
+          <a:chOff x="0" y="0"/>
+          <a:chExt cx="0" cy="0"/>
+        </a:xfrm>
+      </p:grpSpPr>
+      <p:sp>
+        <p:nvSpPr>
+          <p:cNvPr id="308" name="Google Shape;308;p34"/>
+          <p:cNvSpPr txBox="1"/>
+          <p:nvPr>
+            <p:ph type="title"/>
+          </p:nvPr>
+        </p:nvSpPr>
+        <p:spPr>
+          <a:xfrm>
+            <a:off x="436700" y="396625"/>
+            <a:ext cx="8235600" cy="1059300"/>
+          </a:xfrm>
+          <a:prstGeom prst="rect">
+            <a:avLst/>
+          </a:prstGeom>
+        </p:spPr>
+        <p:txBody>
+          <a:bodyPr anchorCtr="0" anchor="t" bIns="91425" lIns="91425" spcFirstLastPara="1" rIns="91425" wrap="square" tIns="91425">
+            <a:noAutofit/>
+          </a:bodyPr>
+          <a:lstStyle/>
+          <a:p>
+            <a:pPr indent="0" lvl="0" marL="0" rtl="0" algn="ctr">
+              <a:spcBef>
+                <a:spcPts val="0"/>
+              </a:spcBef>
+              <a:spcAft>
+                <a:spcPts val="0"/>
+              </a:spcAft>
+              <a:buNone/>
+            </a:pPr>
+            <a:r>
+              <a:rPr lang="en"/>
               <a:t>Koda piemērs, kur izmanto ifstream, lai izvadītu failā rakstīt</a:t>
             </a:r>
             <a:endParaRPr/>
@@ -27412,7 +27970,7 @@
       </p:sp>
       <p:pic>
         <p:nvPicPr>
-          <p:cNvPr id="298" name="Google Shape;298;p32"/>
+          <p:cNvPr id="309" name="Google Shape;309;p34"/>
           <p:cNvPicPr preferRelativeResize="0"/>
           <p:nvPr/>
         </p:nvPicPr>
@@ -27440,7 +27998,7 @@
       </p:pic>
       <p:pic>
         <p:nvPicPr>
-          <p:cNvPr id="299" name="Google Shape;299;p32"/>
+          <p:cNvPr id="310" name="Google Shape;310;p34"/>
           <p:cNvPicPr preferRelativeResize="0"/>
           <p:nvPr/>
         </p:nvPicPr>
@@ -27468,7 +28026,7 @@
       </p:pic>
       <p:sp>
         <p:nvSpPr>
-          <p:cNvPr id="300" name="Google Shape;300;p32"/>
+          <p:cNvPr id="311" name="Google Shape;311;p34"/>
           <p:cNvSpPr txBox="1"/>
           <p:nvPr/>
         </p:nvSpPr>
@@ -27526,7 +28084,7 @@
       </p:sp>
       <p:sp>
         <p:nvSpPr>
-          <p:cNvPr id="301" name="Google Shape;301;p32"/>
+          <p:cNvPr id="312" name="Google Shape;312;p34"/>
           <p:cNvSpPr txBox="1"/>
           <p:nvPr/>
         </p:nvSpPr>
@@ -27590,12 +28148,12 @@
 </p:sld>
 </file>
 
-<file path=ppt/slides/slide11.xml><?xml version="1.0" encoding="utf-8"?>
+<file path=ppt/slides/slide13.xml><?xml version="1.0" encoding="utf-8"?>
 <p:sld xmlns:a="http://schemas.openxmlformats.org/drawingml/2006/main" xmlns:r="http://schemas.openxmlformats.org/officeDocument/2006/relationships" xmlns:mc="http://schemas.openxmlformats.org/markup-compatibility/2006" xmlns:mv="urn:schemas-microsoft-com:mac:vml" xmlns:p="http://schemas.openxmlformats.org/presentationml/2006/main" xmlns:c="http://schemas.openxmlformats.org/drawingml/2006/chart" xmlns:dgm="http://schemas.openxmlformats.org/drawingml/2006/diagram" xmlns:o="urn:schemas-microsoft-com:office:office" xmlns:v="urn:schemas-microsoft-com:vml" xmlns:pvml="urn:schemas-microsoft-com:office:powerpoint" xmlns:com="http://schemas.openxmlformats.org/drawingml/2006/compatibility" xmlns:p14="http://schemas.microsoft.com/office/powerpoint/2010/main" xmlns:p15="http://schemas.microsoft.com/office/powerpoint/2012/main" xmlns:ahyp="http://schemas.microsoft.com/office/drawing/2018/hyperlinkcolor">
   <p:cSld>
     <p:spTree>
       <p:nvGrpSpPr>
-        <p:cNvPr id="305" name="Shape 305"/>
+        <p:cNvPr id="316" name="Shape 316"/>
         <p:cNvGrpSpPr/>
         <p:nvPr/>
       </p:nvGrpSpPr>
@@ -27609,7 +28167,7 @@
       </p:grpSpPr>
       <p:sp>
         <p:nvSpPr>
-          <p:cNvPr id="306" name="Google Shape;306;p33"/>
+          <p:cNvPr id="317" name="Google Shape;317;p35"/>
           <p:cNvSpPr txBox="1"/>
           <p:nvPr>
             <p:ph type="title"/>
@@ -27649,7 +28207,7 @@
       </p:sp>
       <p:pic>
         <p:nvPicPr>
-          <p:cNvPr id="307" name="Google Shape;307;p33"/>
+          <p:cNvPr id="318" name="Google Shape;318;p35"/>
           <p:cNvPicPr preferRelativeResize="0"/>
           <p:nvPr/>
         </p:nvPicPr>
@@ -27677,7 +28235,7 @@
       </p:pic>
       <p:sp>
         <p:nvSpPr>
-          <p:cNvPr id="308" name="Google Shape;308;p33"/>
+          <p:cNvPr id="319" name="Google Shape;319;p35"/>
           <p:cNvSpPr txBox="1"/>
           <p:nvPr/>
         </p:nvSpPr>
@@ -27741,12 +28299,12 @@
 </p:sld>
 </file>
 
-<file path=ppt/slides/slide12.xml><?xml version="1.0" encoding="utf-8"?>
+<file path=ppt/slides/slide14.xml><?xml version="1.0" encoding="utf-8"?>
 <p:sld xmlns:a="http://schemas.openxmlformats.org/drawingml/2006/main" xmlns:r="http://schemas.openxmlformats.org/officeDocument/2006/relationships" xmlns:mc="http://schemas.openxmlformats.org/markup-compatibility/2006" xmlns:mv="urn:schemas-microsoft-com:mac:vml" xmlns:p="http://schemas.openxmlformats.org/presentationml/2006/main" xmlns:c="http://schemas.openxmlformats.org/drawingml/2006/chart" xmlns:dgm="http://schemas.openxmlformats.org/drawingml/2006/diagram" xmlns:o="urn:schemas-microsoft-com:office:office" xmlns:v="urn:schemas-microsoft-com:vml" xmlns:pvml="urn:schemas-microsoft-com:office:powerpoint" xmlns:com="http://schemas.openxmlformats.org/drawingml/2006/compatibility" xmlns:p14="http://schemas.microsoft.com/office/powerpoint/2010/main" xmlns:p15="http://schemas.microsoft.com/office/powerpoint/2012/main" xmlns:ahyp="http://schemas.microsoft.com/office/drawing/2018/hyperlinkcolor">
   <p:cSld>
     <p:spTree>
       <p:nvGrpSpPr>
-        <p:cNvPr id="312" name="Shape 312"/>
+        <p:cNvPr id="323" name="Shape 323"/>
         <p:cNvGrpSpPr/>
         <p:nvPr/>
       </p:nvGrpSpPr>
@@ -27760,7 +28318,7 @@
       </p:grpSpPr>
       <p:sp>
         <p:nvSpPr>
-          <p:cNvPr id="313" name="Google Shape;313;p34"/>
+          <p:cNvPr id="324" name="Google Shape;324;p36"/>
           <p:cNvSpPr txBox="1"/>
           <p:nvPr>
             <p:ph type="title"/>
@@ -27800,7 +28358,7 @@
       </p:sp>
       <p:sp>
         <p:nvSpPr>
-          <p:cNvPr id="314" name="Google Shape;314;p34"/>
+          <p:cNvPr id="325" name="Google Shape;325;p36"/>
           <p:cNvSpPr txBox="1"/>
           <p:nvPr/>
         </p:nvSpPr>
@@ -27870,7 +28428,7 @@
       </p:sp>
       <p:sp>
         <p:nvSpPr>
-          <p:cNvPr id="315" name="Google Shape;315;p34"/>
+          <p:cNvPr id="326" name="Google Shape;326;p36"/>
           <p:cNvSpPr txBox="1"/>
           <p:nvPr/>
         </p:nvSpPr>
@@ -27940,7 +28498,7 @@
       </p:sp>
       <p:pic>
         <p:nvPicPr>
-          <p:cNvPr id="316" name="Google Shape;316;p34"/>
+          <p:cNvPr id="327" name="Google Shape;327;p36"/>
           <p:cNvPicPr preferRelativeResize="0"/>
           <p:nvPr/>
         </p:nvPicPr>
@@ -27968,7 +28526,7 @@
       </p:pic>
       <p:pic>
         <p:nvPicPr>
-          <p:cNvPr id="317" name="Google Shape;317;p34"/>
+          <p:cNvPr id="328" name="Google Shape;328;p36"/>
           <p:cNvPicPr preferRelativeResize="0"/>
           <p:nvPr/>
         </p:nvPicPr>
@@ -28002,12 +28560,12 @@
 </p:sld>
 </file>
 
-<file path=ppt/slides/slide13.xml><?xml version="1.0" encoding="utf-8"?>
+<file path=ppt/slides/slide15.xml><?xml version="1.0" encoding="utf-8"?>
 <p:sld xmlns:a="http://schemas.openxmlformats.org/drawingml/2006/main" xmlns:r="http://schemas.openxmlformats.org/officeDocument/2006/relationships" xmlns:mc="http://schemas.openxmlformats.org/markup-compatibility/2006" xmlns:mv="urn:schemas-microsoft-com:mac:vml" xmlns:p="http://schemas.openxmlformats.org/presentationml/2006/main" xmlns:c="http://schemas.openxmlformats.org/drawingml/2006/chart" xmlns:dgm="http://schemas.openxmlformats.org/drawingml/2006/diagram" xmlns:o="urn:schemas-microsoft-com:office:office" xmlns:v="urn:schemas-microsoft-com:vml" xmlns:pvml="urn:schemas-microsoft-com:office:powerpoint" xmlns:com="http://schemas.openxmlformats.org/drawingml/2006/compatibility" xmlns:p14="http://schemas.microsoft.com/office/powerpoint/2010/main" xmlns:p15="http://schemas.microsoft.com/office/powerpoint/2012/main" xmlns:ahyp="http://schemas.microsoft.com/office/drawing/2018/hyperlinkcolor">
   <p:cSld>
     <p:spTree>
       <p:nvGrpSpPr>
-        <p:cNvPr id="321" name="Shape 321"/>
+        <p:cNvPr id="332" name="Shape 332"/>
         <p:cNvGrpSpPr/>
         <p:nvPr/>
       </p:nvGrpSpPr>
@@ -28021,7 +28579,7 @@
       </p:grpSpPr>
       <p:sp>
         <p:nvSpPr>
-          <p:cNvPr id="322" name="Google Shape;322;p35"/>
+          <p:cNvPr id="333" name="Google Shape;333;p37"/>
           <p:cNvSpPr txBox="1"/>
           <p:nvPr>
             <p:ph type="title"/>
@@ -28061,7 +28619,7 @@
       </p:sp>
       <p:pic>
         <p:nvPicPr>
-          <p:cNvPr id="323" name="Google Shape;323;p35"/>
+          <p:cNvPr id="334" name="Google Shape;334;p37"/>
           <p:cNvPicPr preferRelativeResize="0"/>
           <p:nvPr/>
         </p:nvPicPr>
@@ -28089,7 +28647,7 @@
       </p:pic>
       <p:sp>
         <p:nvSpPr>
-          <p:cNvPr id="324" name="Google Shape;324;p35"/>
+          <p:cNvPr id="335" name="Google Shape;335;p37"/>
           <p:cNvSpPr txBox="1"/>
           <p:nvPr/>
         </p:nvSpPr>
@@ -28153,12 +28711,12 @@
 </p:sld>
 </file>
 
-<file path=ppt/slides/slide14.xml><?xml version="1.0" encoding="utf-8"?>
+<file path=ppt/slides/slide16.xml><?xml version="1.0" encoding="utf-8"?>
 <p:sld xmlns:a="http://schemas.openxmlformats.org/drawingml/2006/main" xmlns:r="http://schemas.openxmlformats.org/officeDocument/2006/relationships" xmlns:mc="http://schemas.openxmlformats.org/markup-compatibility/2006" xmlns:mv="urn:schemas-microsoft-com:mac:vml" xmlns:p="http://schemas.openxmlformats.org/presentationml/2006/main" xmlns:c="http://schemas.openxmlformats.org/drawingml/2006/chart" xmlns:dgm="http://schemas.openxmlformats.org/drawingml/2006/diagram" xmlns:o="urn:schemas-microsoft-com:office:office" xmlns:v="urn:schemas-microsoft-com:vml" xmlns:pvml="urn:schemas-microsoft-com:office:powerpoint" xmlns:com="http://schemas.openxmlformats.org/drawingml/2006/compatibility" xmlns:p14="http://schemas.microsoft.com/office/powerpoint/2010/main" xmlns:p15="http://schemas.microsoft.com/office/powerpoint/2012/main" xmlns:ahyp="http://schemas.microsoft.com/office/drawing/2018/hyperlinkcolor">
   <p:cSld>
     <p:spTree>
       <p:nvGrpSpPr>
-        <p:cNvPr id="328" name="Shape 328"/>
+        <p:cNvPr id="339" name="Shape 339"/>
         <p:cNvGrpSpPr/>
         <p:nvPr/>
       </p:nvGrpSpPr>
@@ -28172,7 +28730,7 @@
       </p:grpSpPr>
       <p:sp>
         <p:nvSpPr>
-          <p:cNvPr id="329" name="Google Shape;329;p36"/>
+          <p:cNvPr id="340" name="Google Shape;340;p38"/>
           <p:cNvSpPr txBox="1"/>
           <p:nvPr>
             <p:ph type="title"/>
@@ -28212,7 +28770,7 @@
       </p:sp>
       <p:sp>
         <p:nvSpPr>
-          <p:cNvPr id="330" name="Google Shape;330;p36"/>
+          <p:cNvPr id="341" name="Google Shape;341;p38"/>
           <p:cNvSpPr txBox="1"/>
           <p:nvPr/>
         </p:nvSpPr>
@@ -28270,7 +28828,7 @@
       </p:sp>
       <p:sp>
         <p:nvSpPr>
-          <p:cNvPr id="331" name="Google Shape;331;p36"/>
+          <p:cNvPr id="342" name="Google Shape;342;p38"/>
           <p:cNvSpPr txBox="1"/>
           <p:nvPr/>
         </p:nvSpPr>
@@ -28328,7 +28886,7 @@
       </p:sp>
       <p:pic>
         <p:nvPicPr>
-          <p:cNvPr id="332" name="Google Shape;332;p36"/>
+          <p:cNvPr id="343" name="Google Shape;343;p38"/>
           <p:cNvPicPr preferRelativeResize="0"/>
           <p:nvPr/>
         </p:nvPicPr>
@@ -28356,7 +28914,7 @@
       </p:pic>
       <p:pic>
         <p:nvPicPr>
-          <p:cNvPr id="333" name="Google Shape;333;p36"/>
+          <p:cNvPr id="344" name="Google Shape;344;p38"/>
           <p:cNvPicPr preferRelativeResize="0"/>
           <p:nvPr/>
         </p:nvPicPr>
@@ -28382,164 +28940,6 @@
           </a:ln>
         </p:spPr>
       </p:pic>
-    </p:spTree>
-  </p:cSld>
-  <p:clrMapOvr>
-    <a:masterClrMapping/>
-  </p:clrMapOvr>
-</p:sld>
-</file>
-
-<file path=ppt/slides/slide15.xml><?xml version="1.0" encoding="utf-8"?>
-<p:sld xmlns:a="http://schemas.openxmlformats.org/drawingml/2006/main" xmlns:r="http://schemas.openxmlformats.org/officeDocument/2006/relationships" xmlns:mc="http://schemas.openxmlformats.org/markup-compatibility/2006" xmlns:mv="urn:schemas-microsoft-com:mac:vml" xmlns:p="http://schemas.openxmlformats.org/presentationml/2006/main" xmlns:c="http://schemas.openxmlformats.org/drawingml/2006/chart" xmlns:dgm="http://schemas.openxmlformats.org/drawingml/2006/diagram" xmlns:o="urn:schemas-microsoft-com:office:office" xmlns:v="urn:schemas-microsoft-com:vml" xmlns:pvml="urn:schemas-microsoft-com:office:powerpoint" xmlns:com="http://schemas.openxmlformats.org/drawingml/2006/compatibility" xmlns:p14="http://schemas.microsoft.com/office/powerpoint/2010/main" xmlns:p15="http://schemas.microsoft.com/office/powerpoint/2012/main" xmlns:ahyp="http://schemas.microsoft.com/office/drawing/2018/hyperlinkcolor">
-  <p:cSld>
-    <p:spTree>
-      <p:nvGrpSpPr>
-        <p:cNvPr id="337" name="Shape 337"/>
-        <p:cNvGrpSpPr/>
-        <p:nvPr/>
-      </p:nvGrpSpPr>
-      <p:grpSpPr>
-        <a:xfrm>
-          <a:off x="0" y="0"/>
-          <a:ext cx="0" cy="0"/>
-          <a:chOff x="0" y="0"/>
-          <a:chExt cx="0" cy="0"/>
-        </a:xfrm>
-      </p:grpSpPr>
-      <p:sp>
-        <p:nvSpPr>
-          <p:cNvPr id="338" name="Google Shape;338;p37"/>
-          <p:cNvSpPr txBox="1"/>
-          <p:nvPr>
-            <p:ph type="title"/>
-          </p:nvPr>
-        </p:nvSpPr>
-        <p:spPr>
-          <a:xfrm>
-            <a:off x="251925" y="990100"/>
-            <a:ext cx="4118700" cy="1059300"/>
-          </a:xfrm>
-          <a:prstGeom prst="rect">
-            <a:avLst/>
-          </a:prstGeom>
-        </p:spPr>
-        <p:txBody>
-          <a:bodyPr anchorCtr="0" anchor="t" bIns="91425" lIns="91425" spcFirstLastPara="1" rIns="91425" wrap="square" tIns="91425">
-            <a:noAutofit/>
-          </a:bodyPr>
-          <a:lstStyle/>
-          <a:p>
-            <a:pPr indent="0" lvl="0" marL="0" rtl="0" algn="ctr">
-              <a:spcBef>
-                <a:spcPts val="0"/>
-              </a:spcBef>
-              <a:spcAft>
-                <a:spcPts val="0"/>
-              </a:spcAft>
-              <a:buNone/>
-            </a:pPr>
-            <a:r>
-              <a:rPr lang="en" sz="3000"/>
-              <a:t>Koda piemērs, kurā paradā, kā ar if un of stream var izveidot programmu, kura apreiķina cik ‘o’ burtu ir tekstā</a:t>
-            </a:r>
-            <a:endParaRPr sz="3000"/>
-          </a:p>
-        </p:txBody>
-      </p:sp>
-      <p:pic>
-        <p:nvPicPr>
-          <p:cNvPr id="339" name="Google Shape;339;p37"/>
-          <p:cNvPicPr preferRelativeResize="0"/>
-          <p:nvPr/>
-        </p:nvPicPr>
-        <p:blipFill>
-          <a:blip r:embed="rId3">
-            <a:alphaModFix/>
-          </a:blip>
-          <a:stretch>
-            <a:fillRect/>
-          </a:stretch>
-        </p:blipFill>
-        <p:spPr>
-          <a:xfrm>
-            <a:off x="4370625" y="1218712"/>
-            <a:ext cx="4182600" cy="2706075"/>
-          </a:xfrm>
-          <a:prstGeom prst="rect">
-            <a:avLst/>
-          </a:prstGeom>
-          <a:noFill/>
-          <a:ln>
-            <a:noFill/>
-          </a:ln>
-        </p:spPr>
-      </p:pic>
-    </p:spTree>
-  </p:cSld>
-  <p:clrMapOvr>
-    <a:masterClrMapping/>
-  </p:clrMapOvr>
-</p:sld>
-</file>
-
-<file path=ppt/slides/slide16.xml><?xml version="1.0" encoding="utf-8"?>
-<p:sld xmlns:a="http://schemas.openxmlformats.org/drawingml/2006/main" xmlns:r="http://schemas.openxmlformats.org/officeDocument/2006/relationships" xmlns:mc="http://schemas.openxmlformats.org/markup-compatibility/2006" xmlns:mv="urn:schemas-microsoft-com:mac:vml" xmlns:p="http://schemas.openxmlformats.org/presentationml/2006/main" xmlns:c="http://schemas.openxmlformats.org/drawingml/2006/chart" xmlns:dgm="http://schemas.openxmlformats.org/drawingml/2006/diagram" xmlns:o="urn:schemas-microsoft-com:office:office" xmlns:v="urn:schemas-microsoft-com:vml" xmlns:pvml="urn:schemas-microsoft-com:office:powerpoint" xmlns:com="http://schemas.openxmlformats.org/drawingml/2006/compatibility" xmlns:p14="http://schemas.microsoft.com/office/powerpoint/2010/main" xmlns:p15="http://schemas.microsoft.com/office/powerpoint/2012/main" xmlns:ahyp="http://schemas.microsoft.com/office/drawing/2018/hyperlinkcolor">
-  <p:cSld>
-    <p:spTree>
-      <p:nvGrpSpPr>
-        <p:cNvPr id="343" name="Shape 343"/>
-        <p:cNvGrpSpPr/>
-        <p:nvPr/>
-      </p:nvGrpSpPr>
-      <p:grpSpPr>
-        <a:xfrm>
-          <a:off x="0" y="0"/>
-          <a:ext cx="0" cy="0"/>
-          <a:chOff x="0" y="0"/>
-          <a:chExt cx="0" cy="0"/>
-        </a:xfrm>
-      </p:grpSpPr>
-      <p:sp>
-        <p:nvSpPr>
-          <p:cNvPr id="344" name="Google Shape;344;p38"/>
-          <p:cNvSpPr txBox="1"/>
-          <p:nvPr>
-            <p:ph type="title"/>
-          </p:nvPr>
-        </p:nvSpPr>
-        <p:spPr>
-          <a:xfrm>
-            <a:off x="1539350" y="527775"/>
-            <a:ext cx="7713900" cy="664200"/>
-          </a:xfrm>
-          <a:prstGeom prst="rect">
-            <a:avLst/>
-          </a:prstGeom>
-        </p:spPr>
-        <p:txBody>
-          <a:bodyPr anchorCtr="0" anchor="t" bIns="91425" lIns="91425" spcFirstLastPara="1" rIns="91425" wrap="square" tIns="91425">
-            <a:noAutofit/>
-          </a:bodyPr>
-          <a:lstStyle/>
-          <a:p>
-            <a:pPr indent="0" lvl="0" marL="0" rtl="0" algn="l">
-              <a:spcBef>
-                <a:spcPts val="0"/>
-              </a:spcBef>
-              <a:spcAft>
-                <a:spcPts val="0"/>
-              </a:spcAft>
-              <a:buNone/>
-            </a:pPr>
-            <a:r>
-              <a:rPr lang="en" sz="4000"/>
-              <a:t>Paldies par jūsu uzmanību!</a:t>
-            </a:r>
-            <a:endParaRPr sz="4000"/>
-          </a:p>
-        </p:txBody>
-      </p:sp>
     </p:spTree>
   </p:cSld>
   <p:clrMapOvr>
@@ -28575,6 +28975,164 @@
         </p:nvSpPr>
         <p:spPr>
           <a:xfrm>
+            <a:off x="251925" y="990100"/>
+            <a:ext cx="4118700" cy="1059300"/>
+          </a:xfrm>
+          <a:prstGeom prst="rect">
+            <a:avLst/>
+          </a:prstGeom>
+        </p:spPr>
+        <p:txBody>
+          <a:bodyPr anchorCtr="0" anchor="t" bIns="91425" lIns="91425" spcFirstLastPara="1" rIns="91425" wrap="square" tIns="91425">
+            <a:noAutofit/>
+          </a:bodyPr>
+          <a:lstStyle/>
+          <a:p>
+            <a:pPr indent="0" lvl="0" marL="0" rtl="0" algn="ctr">
+              <a:spcBef>
+                <a:spcPts val="0"/>
+              </a:spcBef>
+              <a:spcAft>
+                <a:spcPts val="0"/>
+              </a:spcAft>
+              <a:buNone/>
+            </a:pPr>
+            <a:r>
+              <a:rPr lang="en" sz="3000"/>
+              <a:t>Koda piemērs, kurā paradā, kā ar if un of stream var izveidot programmu, kura apreiķina cik ‘o’ burtu ir tekstā</a:t>
+            </a:r>
+            <a:endParaRPr sz="3000"/>
+          </a:p>
+        </p:txBody>
+      </p:sp>
+      <p:pic>
+        <p:nvPicPr>
+          <p:cNvPr id="350" name="Google Shape;350;p39"/>
+          <p:cNvPicPr preferRelativeResize="0"/>
+          <p:nvPr/>
+        </p:nvPicPr>
+        <p:blipFill>
+          <a:blip r:embed="rId3">
+            <a:alphaModFix/>
+          </a:blip>
+          <a:stretch>
+            <a:fillRect/>
+          </a:stretch>
+        </p:blipFill>
+        <p:spPr>
+          <a:xfrm>
+            <a:off x="4370625" y="1218712"/>
+            <a:ext cx="4182600" cy="2706075"/>
+          </a:xfrm>
+          <a:prstGeom prst="rect">
+            <a:avLst/>
+          </a:prstGeom>
+          <a:noFill/>
+          <a:ln>
+            <a:noFill/>
+          </a:ln>
+        </p:spPr>
+      </p:pic>
+    </p:spTree>
+  </p:cSld>
+  <p:clrMapOvr>
+    <a:masterClrMapping/>
+  </p:clrMapOvr>
+</p:sld>
+</file>
+
+<file path=ppt/slides/slide18.xml><?xml version="1.0" encoding="utf-8"?>
+<p:sld xmlns:a="http://schemas.openxmlformats.org/drawingml/2006/main" xmlns:r="http://schemas.openxmlformats.org/officeDocument/2006/relationships" xmlns:mc="http://schemas.openxmlformats.org/markup-compatibility/2006" xmlns:mv="urn:schemas-microsoft-com:mac:vml" xmlns:p="http://schemas.openxmlformats.org/presentationml/2006/main" xmlns:c="http://schemas.openxmlformats.org/drawingml/2006/chart" xmlns:dgm="http://schemas.openxmlformats.org/drawingml/2006/diagram" xmlns:o="urn:schemas-microsoft-com:office:office" xmlns:v="urn:schemas-microsoft-com:vml" xmlns:pvml="urn:schemas-microsoft-com:office:powerpoint" xmlns:com="http://schemas.openxmlformats.org/drawingml/2006/compatibility" xmlns:p14="http://schemas.microsoft.com/office/powerpoint/2010/main" xmlns:p15="http://schemas.microsoft.com/office/powerpoint/2012/main" xmlns:ahyp="http://schemas.microsoft.com/office/drawing/2018/hyperlinkcolor">
+  <p:cSld>
+    <p:spTree>
+      <p:nvGrpSpPr>
+        <p:cNvPr id="354" name="Shape 354"/>
+        <p:cNvGrpSpPr/>
+        <p:nvPr/>
+      </p:nvGrpSpPr>
+      <p:grpSpPr>
+        <a:xfrm>
+          <a:off x="0" y="0"/>
+          <a:ext cx="0" cy="0"/>
+          <a:chOff x="0" y="0"/>
+          <a:chExt cx="0" cy="0"/>
+        </a:xfrm>
+      </p:grpSpPr>
+      <p:sp>
+        <p:nvSpPr>
+          <p:cNvPr id="355" name="Google Shape;355;p40"/>
+          <p:cNvSpPr txBox="1"/>
+          <p:nvPr>
+            <p:ph type="title"/>
+          </p:nvPr>
+        </p:nvSpPr>
+        <p:spPr>
+          <a:xfrm>
+            <a:off x="1539350" y="527775"/>
+            <a:ext cx="7713900" cy="664200"/>
+          </a:xfrm>
+          <a:prstGeom prst="rect">
+            <a:avLst/>
+          </a:prstGeom>
+        </p:spPr>
+        <p:txBody>
+          <a:bodyPr anchorCtr="0" anchor="t" bIns="91425" lIns="91425" spcFirstLastPara="1" rIns="91425" wrap="square" tIns="91425">
+            <a:noAutofit/>
+          </a:bodyPr>
+          <a:lstStyle/>
+          <a:p>
+            <a:pPr indent="0" lvl="0" marL="0" rtl="0" algn="l">
+              <a:spcBef>
+                <a:spcPts val="0"/>
+              </a:spcBef>
+              <a:spcAft>
+                <a:spcPts val="0"/>
+              </a:spcAft>
+              <a:buNone/>
+            </a:pPr>
+            <a:r>
+              <a:rPr lang="en" sz="4000"/>
+              <a:t>Paldies par jūsu uzmanību!</a:t>
+            </a:r>
+            <a:endParaRPr sz="4000"/>
+          </a:p>
+        </p:txBody>
+      </p:sp>
+    </p:spTree>
+  </p:cSld>
+  <p:clrMapOvr>
+    <a:masterClrMapping/>
+  </p:clrMapOvr>
+</p:sld>
+</file>
+
+<file path=ppt/slides/slide19.xml><?xml version="1.0" encoding="utf-8"?>
+<p:sld xmlns:a="http://schemas.openxmlformats.org/drawingml/2006/main" xmlns:r="http://schemas.openxmlformats.org/officeDocument/2006/relationships" xmlns:mc="http://schemas.openxmlformats.org/markup-compatibility/2006" xmlns:mv="urn:schemas-microsoft-com:mac:vml" xmlns:p="http://schemas.openxmlformats.org/presentationml/2006/main" xmlns:c="http://schemas.openxmlformats.org/drawingml/2006/chart" xmlns:dgm="http://schemas.openxmlformats.org/drawingml/2006/diagram" xmlns:o="urn:schemas-microsoft-com:office:office" xmlns:v="urn:schemas-microsoft-com:vml" xmlns:pvml="urn:schemas-microsoft-com:office:powerpoint" xmlns:com="http://schemas.openxmlformats.org/drawingml/2006/compatibility" xmlns:p14="http://schemas.microsoft.com/office/powerpoint/2010/main" xmlns:p15="http://schemas.microsoft.com/office/powerpoint/2012/main" xmlns:ahyp="http://schemas.microsoft.com/office/drawing/2018/hyperlinkcolor">
+  <p:cSld>
+    <p:spTree>
+      <p:nvGrpSpPr>
+        <p:cNvPr id="359" name="Shape 359"/>
+        <p:cNvGrpSpPr/>
+        <p:nvPr/>
+      </p:nvGrpSpPr>
+      <p:grpSpPr>
+        <a:xfrm>
+          <a:off x="0" y="0"/>
+          <a:ext cx="0" cy="0"/>
+          <a:chOff x="0" y="0"/>
+          <a:chExt cx="0" cy="0"/>
+        </a:xfrm>
+      </p:grpSpPr>
+      <p:sp>
+        <p:nvSpPr>
+          <p:cNvPr id="360" name="Google Shape;360;p41"/>
+          <p:cNvSpPr txBox="1"/>
+          <p:nvPr>
+            <p:ph type="title"/>
+          </p:nvPr>
+        </p:nvSpPr>
+        <p:spPr>
+          <a:xfrm>
             <a:off x="715100" y="535000"/>
             <a:ext cx="7713900" cy="664200"/>
           </a:xfrm>
@@ -28607,7 +29165,7 @@
       </p:sp>
       <p:sp>
         <p:nvSpPr>
-          <p:cNvPr id="350" name="Google Shape;350;p39"/>
+          <p:cNvPr id="361" name="Google Shape;361;p41"/>
           <p:cNvSpPr txBox="1"/>
           <p:nvPr/>
         </p:nvSpPr>
@@ -29462,6 +30020,168 @@
         </p:nvSpPr>
         <p:spPr>
           <a:xfrm>
+            <a:off x="692700" y="470350"/>
+            <a:ext cx="7758600" cy="942900"/>
+          </a:xfrm>
+          <a:prstGeom prst="rect">
+            <a:avLst/>
+          </a:prstGeom>
+        </p:spPr>
+        <p:txBody>
+          <a:bodyPr anchorCtr="0" anchor="t" bIns="91425" lIns="91425" spcFirstLastPara="1" rIns="91425" wrap="square" tIns="91425">
+            <a:noAutofit/>
+          </a:bodyPr>
+          <a:lstStyle/>
+          <a:p>
+            <a:pPr indent="0" lvl="0" marL="0" rtl="0" algn="ctr">
+              <a:spcBef>
+                <a:spcPts val="0"/>
+              </a:spcBef>
+              <a:spcAft>
+                <a:spcPts val="0"/>
+              </a:spcAft>
+              <a:buNone/>
+            </a:pPr>
+            <a:r>
+              <a:rPr lang="en" sz="6300"/>
+              <a:t>Pirms veidojam kodu, uzzināsim par dažām funkcijām, kas varētu palīdzēt:</a:t>
+            </a:r>
+            <a:endParaRPr sz="6300"/>
+          </a:p>
+        </p:txBody>
+      </p:sp>
+    </p:spTree>
+  </p:cSld>
+  <p:clrMapOvr>
+    <a:masterClrMapping/>
+  </p:clrMapOvr>
+</p:sld>
+</file>
+
+<file path=ppt/slides/slide7.xml><?xml version="1.0" encoding="utf-8"?>
+<p:sld xmlns:a="http://schemas.openxmlformats.org/drawingml/2006/main" xmlns:r="http://schemas.openxmlformats.org/officeDocument/2006/relationships" xmlns:mc="http://schemas.openxmlformats.org/markup-compatibility/2006" xmlns:mv="urn:schemas-microsoft-com:mac:vml" xmlns:p="http://schemas.openxmlformats.org/presentationml/2006/main" xmlns:c="http://schemas.openxmlformats.org/drawingml/2006/chart" xmlns:dgm="http://schemas.openxmlformats.org/drawingml/2006/diagram" xmlns:o="urn:schemas-microsoft-com:office:office" xmlns:v="urn:schemas-microsoft-com:vml" xmlns:pvml="urn:schemas-microsoft-com:office:powerpoint" xmlns:com="http://schemas.openxmlformats.org/drawingml/2006/compatibility" xmlns:p14="http://schemas.microsoft.com/office/powerpoint/2010/main" xmlns:p15="http://schemas.microsoft.com/office/powerpoint/2012/main" xmlns:ahyp="http://schemas.microsoft.com/office/drawing/2018/hyperlinkcolor">
+  <p:cSld>
+    <p:spTree>
+      <p:nvGrpSpPr>
+        <p:cNvPr id="268" name="Shape 268"/>
+        <p:cNvGrpSpPr/>
+        <p:nvPr/>
+      </p:nvGrpSpPr>
+      <p:grpSpPr>
+        <a:xfrm>
+          <a:off x="0" y="0"/>
+          <a:ext cx="0" cy="0"/>
+          <a:chOff x="0" y="0"/>
+          <a:chExt cx="0" cy="0"/>
+        </a:xfrm>
+      </p:grpSpPr>
+      <p:pic>
+        <p:nvPicPr>
+          <p:cNvPr id="269" name="Google Shape;269;p29"/>
+          <p:cNvPicPr preferRelativeResize="0"/>
+          <p:nvPr/>
+        </p:nvPicPr>
+        <p:blipFill>
+          <a:blip r:embed="rId3">
+            <a:alphaModFix/>
+          </a:blip>
+          <a:stretch>
+            <a:fillRect/>
+          </a:stretch>
+        </p:blipFill>
+        <p:spPr>
+          <a:xfrm>
+            <a:off x="875213" y="1503275"/>
+            <a:ext cx="7393574" cy="1812550"/>
+          </a:xfrm>
+          <a:prstGeom prst="rect">
+            <a:avLst/>
+          </a:prstGeom>
+          <a:noFill/>
+          <a:ln>
+            <a:noFill/>
+          </a:ln>
+        </p:spPr>
+      </p:pic>
+      <p:sp>
+        <p:nvSpPr>
+          <p:cNvPr id="270" name="Google Shape;270;p29"/>
+          <p:cNvSpPr txBox="1"/>
+          <p:nvPr>
+            <p:ph type="title"/>
+          </p:nvPr>
+        </p:nvSpPr>
+        <p:spPr>
+          <a:xfrm>
+            <a:off x="1187700" y="426400"/>
+            <a:ext cx="6768600" cy="664200"/>
+          </a:xfrm>
+          <a:prstGeom prst="rect">
+            <a:avLst/>
+          </a:prstGeom>
+        </p:spPr>
+        <p:txBody>
+          <a:bodyPr anchorCtr="0" anchor="t" bIns="91425" lIns="91425" spcFirstLastPara="1" rIns="91425" wrap="square" tIns="91425">
+            <a:noAutofit/>
+          </a:bodyPr>
+          <a:lstStyle/>
+          <a:p>
+            <a:pPr indent="0" lvl="0" marL="0" rtl="0" algn="l">
+              <a:spcBef>
+                <a:spcPts val="0"/>
+              </a:spcBef>
+              <a:spcAft>
+                <a:spcPts val="0"/>
+              </a:spcAft>
+              <a:buNone/>
+            </a:pPr>
+            <a:r>
+              <a:rPr lang="en" sz="3300"/>
+              <a:t>Dažas no svarīgākajām funkcijām</a:t>
+            </a:r>
+            <a:r>
+              <a:rPr lang="en" sz="3300"/>
+              <a:t>:</a:t>
+            </a:r>
+            <a:endParaRPr sz="3300"/>
+          </a:p>
+        </p:txBody>
+      </p:sp>
+    </p:spTree>
+  </p:cSld>
+  <p:clrMapOvr>
+    <a:masterClrMapping/>
+  </p:clrMapOvr>
+</p:sld>
+</file>
+
+<file path=ppt/slides/slide8.xml><?xml version="1.0" encoding="utf-8"?>
+<p:sld xmlns:a="http://schemas.openxmlformats.org/drawingml/2006/main" xmlns:r="http://schemas.openxmlformats.org/officeDocument/2006/relationships" xmlns:mc="http://schemas.openxmlformats.org/markup-compatibility/2006" xmlns:mv="urn:schemas-microsoft-com:mac:vml" xmlns:p="http://schemas.openxmlformats.org/presentationml/2006/main" xmlns:c="http://schemas.openxmlformats.org/drawingml/2006/chart" xmlns:dgm="http://schemas.openxmlformats.org/drawingml/2006/diagram" xmlns:o="urn:schemas-microsoft-com:office:office" xmlns:v="urn:schemas-microsoft-com:vml" xmlns:pvml="urn:schemas-microsoft-com:office:powerpoint" xmlns:com="http://schemas.openxmlformats.org/drawingml/2006/compatibility" xmlns:p14="http://schemas.microsoft.com/office/powerpoint/2010/main" xmlns:p15="http://schemas.microsoft.com/office/powerpoint/2012/main" xmlns:ahyp="http://schemas.microsoft.com/office/drawing/2018/hyperlinkcolor">
+  <p:cSld>
+    <p:spTree>
+      <p:nvGrpSpPr>
+        <p:cNvPr id="274" name="Shape 274"/>
+        <p:cNvGrpSpPr/>
+        <p:nvPr/>
+      </p:nvGrpSpPr>
+      <p:grpSpPr>
+        <a:xfrm>
+          <a:off x="0" y="0"/>
+          <a:ext cx="0" cy="0"/>
+          <a:chOff x="0" y="0"/>
+          <a:chExt cx="0" cy="0"/>
+        </a:xfrm>
+      </p:grpSpPr>
+      <p:sp>
+        <p:nvSpPr>
+          <p:cNvPr id="275" name="Google Shape;275;p30"/>
+          <p:cNvSpPr txBox="1"/>
+          <p:nvPr>
+            <p:ph type="title"/>
+          </p:nvPr>
+        </p:nvSpPr>
+        <p:spPr>
+          <a:xfrm>
             <a:off x="436700" y="396625"/>
             <a:ext cx="8235600" cy="1059300"/>
           </a:xfrm>
@@ -29494,7 +30214,7 @@
       </p:sp>
       <p:pic>
         <p:nvPicPr>
-          <p:cNvPr id="265" name="Google Shape;265;p28"/>
+          <p:cNvPr id="276" name="Google Shape;276;p30"/>
           <p:cNvPicPr preferRelativeResize="0"/>
           <p:nvPr/>
         </p:nvPicPr>
@@ -29522,7 +30242,7 @@
       </p:pic>
       <p:sp>
         <p:nvSpPr>
-          <p:cNvPr id="266" name="Google Shape;266;p28"/>
+          <p:cNvPr id="277" name="Google Shape;277;p30"/>
           <p:cNvSpPr txBox="1"/>
           <p:nvPr/>
         </p:nvSpPr>
@@ -29580,7 +30300,7 @@
       </p:sp>
       <p:sp>
         <p:nvSpPr>
-          <p:cNvPr id="267" name="Google Shape;267;p28"/>
+          <p:cNvPr id="278" name="Google Shape;278;p30"/>
           <p:cNvSpPr txBox="1"/>
           <p:nvPr/>
         </p:nvSpPr>
@@ -29644,12 +30364,12 @@
 </p:sld>
 </file>
 
-<file path=ppt/slides/slide7.xml><?xml version="1.0" encoding="utf-8"?>
+<file path=ppt/slides/slide9.xml><?xml version="1.0" encoding="utf-8"?>
 <p:sld xmlns:a="http://schemas.openxmlformats.org/drawingml/2006/main" xmlns:r="http://schemas.openxmlformats.org/officeDocument/2006/relationships" xmlns:mc="http://schemas.openxmlformats.org/markup-compatibility/2006" xmlns:mv="urn:schemas-microsoft-com:mac:vml" xmlns:p="http://schemas.openxmlformats.org/presentationml/2006/main" xmlns:c="http://schemas.openxmlformats.org/drawingml/2006/chart" xmlns:dgm="http://schemas.openxmlformats.org/drawingml/2006/diagram" xmlns:o="urn:schemas-microsoft-com:office:office" xmlns:v="urn:schemas-microsoft-com:vml" xmlns:pvml="urn:schemas-microsoft-com:office:powerpoint" xmlns:com="http://schemas.openxmlformats.org/drawingml/2006/compatibility" xmlns:p14="http://schemas.microsoft.com/office/powerpoint/2010/main" xmlns:p15="http://schemas.microsoft.com/office/powerpoint/2012/main" xmlns:ahyp="http://schemas.microsoft.com/office/drawing/2018/hyperlinkcolor">
   <p:cSld>
     <p:spTree>
       <p:nvGrpSpPr>
-        <p:cNvPr id="271" name="Shape 271"/>
+        <p:cNvPr id="282" name="Shape 282"/>
         <p:cNvGrpSpPr/>
         <p:nvPr/>
       </p:nvGrpSpPr>
@@ -29663,7 +30383,7 @@
       </p:grpSpPr>
       <p:sp>
         <p:nvSpPr>
-          <p:cNvPr id="272" name="Google Shape;272;p29"/>
+          <p:cNvPr id="283" name="Google Shape;283;p31"/>
           <p:cNvSpPr txBox="1"/>
           <p:nvPr>
             <p:ph type="title"/>
@@ -29703,7 +30423,7 @@
       </p:sp>
       <p:pic>
         <p:nvPicPr>
-          <p:cNvPr id="273" name="Google Shape;273;p29"/>
+          <p:cNvPr id="284" name="Google Shape;284;p31"/>
           <p:cNvPicPr preferRelativeResize="0"/>
           <p:nvPr/>
         </p:nvPicPr>
@@ -29731,7 +30451,7 @@
       </p:pic>
       <p:sp>
         <p:nvSpPr>
-          <p:cNvPr id="274" name="Google Shape;274;p29"/>
+          <p:cNvPr id="285" name="Google Shape;285;p31"/>
           <p:cNvSpPr txBox="1"/>
           <p:nvPr/>
         </p:nvSpPr>
@@ -29789,7 +30509,7 @@
       </p:sp>
       <p:pic>
         <p:nvPicPr>
-          <p:cNvPr id="275" name="Google Shape;275;p29"/>
+          <p:cNvPr id="286" name="Google Shape;286;p31"/>
           <p:cNvPicPr preferRelativeResize="0"/>
           <p:nvPr/>
         </p:nvPicPr>
@@ -29817,7 +30537,7 @@
       </p:pic>
       <p:sp>
         <p:nvSpPr>
-          <p:cNvPr id="276" name="Google Shape;276;p29"/>
+          <p:cNvPr id="287" name="Google Shape;287;p31"/>
           <p:cNvSpPr txBox="1"/>
           <p:nvPr/>
         </p:nvSpPr>
@@ -29881,365 +30601,286 @@
 </p:sld>
 </file>
 
-<file path=ppt/slides/slide8.xml><?xml version="1.0" encoding="utf-8"?>
-<p:sld xmlns:a="http://schemas.openxmlformats.org/drawingml/2006/main" xmlns:r="http://schemas.openxmlformats.org/officeDocument/2006/relationships" xmlns:mc="http://schemas.openxmlformats.org/markup-compatibility/2006" xmlns:mv="urn:schemas-microsoft-com:mac:vml" xmlns:p="http://schemas.openxmlformats.org/presentationml/2006/main" xmlns:c="http://schemas.openxmlformats.org/drawingml/2006/chart" xmlns:dgm="http://schemas.openxmlformats.org/drawingml/2006/diagram" xmlns:o="urn:schemas-microsoft-com:office:office" xmlns:v="urn:schemas-microsoft-com:vml" xmlns:pvml="urn:schemas-microsoft-com:office:powerpoint" xmlns:com="http://schemas.openxmlformats.org/drawingml/2006/compatibility" xmlns:p14="http://schemas.microsoft.com/office/powerpoint/2010/main" xmlns:p15="http://schemas.microsoft.com/office/powerpoint/2012/main" xmlns:ahyp="http://schemas.microsoft.com/office/drawing/2018/hyperlinkcolor">
-  <p:cSld>
-    <p:spTree>
-      <p:nvGrpSpPr>
-        <p:cNvPr id="280" name="Shape 280"/>
-        <p:cNvGrpSpPr/>
-        <p:nvPr/>
-      </p:nvGrpSpPr>
-      <p:grpSpPr>
-        <a:xfrm>
-          <a:off x="0" y="0"/>
-          <a:ext cx="0" cy="0"/>
-          <a:chOff x="0" y="0"/>
-          <a:chExt cx="0" cy="0"/>
-        </a:xfrm>
-      </p:grpSpPr>
-      <p:sp>
-        <p:nvSpPr>
-          <p:cNvPr id="281" name="Google Shape;281;p30"/>
-          <p:cNvSpPr txBox="1"/>
-          <p:nvPr>
-            <p:ph type="title"/>
-          </p:nvPr>
-        </p:nvSpPr>
-        <p:spPr>
-          <a:xfrm>
-            <a:off x="436700" y="396625"/>
-            <a:ext cx="8235600" cy="1059300"/>
-          </a:xfrm>
-          <a:prstGeom prst="rect">
-            <a:avLst/>
-          </a:prstGeom>
-        </p:spPr>
-        <p:txBody>
-          <a:bodyPr anchorCtr="0" anchor="t" bIns="91425" lIns="91425" spcFirstLastPara="1" rIns="91425" wrap="square" tIns="91425">
-            <a:noAutofit/>
-          </a:bodyPr>
-          <a:lstStyle/>
-          <a:p>
-            <a:pPr indent="0" lvl="0" marL="0" rtl="0" algn="ctr">
-              <a:spcBef>
-                <a:spcPts val="0"/>
-              </a:spcBef>
-              <a:spcAft>
-                <a:spcPts val="0"/>
-              </a:spcAft>
-              <a:buNone/>
-            </a:pPr>
-            <a:r>
-              <a:rPr lang="en"/>
-              <a:t>Koda piemērs, kur izmanto ofstream, lai izveidotu failu</a:t>
-            </a:r>
-            <a:endParaRPr/>
-          </a:p>
-        </p:txBody>
-      </p:sp>
-      <p:pic>
-        <p:nvPicPr>
-          <p:cNvPr id="282" name="Google Shape;282;p30"/>
-          <p:cNvPicPr preferRelativeResize="0"/>
-          <p:nvPr/>
-        </p:nvPicPr>
-        <p:blipFill>
-          <a:blip r:embed="rId3">
-            <a:alphaModFix/>
-          </a:blip>
-          <a:stretch>
-            <a:fillRect/>
-          </a:stretch>
-        </p:blipFill>
-        <p:spPr>
-          <a:xfrm>
-            <a:off x="1637250" y="1955050"/>
-            <a:ext cx="5834500" cy="2075950"/>
-          </a:xfrm>
-          <a:prstGeom prst="rect">
-            <a:avLst/>
-          </a:prstGeom>
-          <a:noFill/>
-          <a:ln>
-            <a:noFill/>
-          </a:ln>
-        </p:spPr>
-      </p:pic>
-    </p:spTree>
-  </p:cSld>
-  <p:clrMapOvr>
-    <a:masterClrMapping/>
-  </p:clrMapOvr>
-</p:sld>
+<file path=ppt/theme/theme1.xml><?xml version="1.0" encoding="utf-8"?>
+<a:theme xmlns:a="http://schemas.openxmlformats.org/drawingml/2006/main" xmlns:r="http://schemas.openxmlformats.org/officeDocument/2006/relationships" name="AI Incident Automation Pitch Deck by Slidesgo">
+  <a:themeElements>
+    <a:clrScheme name="Simple Light">
+      <a:dk1>
+        <a:srgbClr val="012169"/>
+      </a:dk1>
+      <a:lt1>
+        <a:srgbClr val="0048A7"/>
+      </a:lt1>
+      <a:dk2>
+        <a:srgbClr val="0388E5"/>
+      </a:dk2>
+      <a:lt2>
+        <a:srgbClr val="3ED4FD"/>
+      </a:lt2>
+      <a:accent1>
+        <a:srgbClr val="DAF2FE"/>
+      </a:accent1>
+      <a:accent2>
+        <a:srgbClr val="6746B9"/>
+      </a:accent2>
+      <a:accent3>
+        <a:srgbClr val="AD8DFF"/>
+      </a:accent3>
+      <a:accent4>
+        <a:srgbClr val="FFFFFF"/>
+      </a:accent4>
+      <a:accent5>
+        <a:srgbClr val="FFFFFF"/>
+      </a:accent5>
+      <a:accent6>
+        <a:srgbClr val="FFFFFF"/>
+      </a:accent6>
+      <a:hlink>
+        <a:srgbClr val="012169"/>
+      </a:hlink>
+      <a:folHlink>
+        <a:srgbClr val="0097A7"/>
+      </a:folHlink>
+    </a:clrScheme>
+    <a:fontScheme name="Office">
+      <a:majorFont>
+        <a:latin typeface="Arial"/>
+        <a:ea typeface=""/>
+        <a:cs typeface=""/>
+        <a:font script="Jpan" typeface="ＭＳ Ｐゴシック"/>
+        <a:font script="Hang" typeface="맑은 고딕"/>
+        <a:font script="Hans" typeface="宋体"/>
+        <a:font script="Hant" typeface="新細明體"/>
+        <a:font script="Arab" typeface="Times New Roman"/>
+        <a:font script="Hebr" typeface="Times New Roman"/>
+        <a:font script="Thai" typeface="Angsana New"/>
+        <a:font script="Ethi" typeface="Nyala"/>
+        <a:font script="Beng" typeface="Vrinda"/>
+        <a:font script="Gujr" typeface="Shruti"/>
+        <a:font script="Khmr" typeface="MoolBoran"/>
+        <a:font script="Knda" typeface="Tunga"/>
+        <a:font script="Guru" typeface="Raavi"/>
+        <a:font script="Cans" typeface="Euphemia"/>
+        <a:font script="Cher" typeface="Plantagenet Cherokee"/>
+        <a:font script="Yiii" typeface="Microsoft Yi Baiti"/>
+        <a:font script="Tibt" typeface="Microsoft Himalaya"/>
+        <a:font script="Thaa" typeface="MV Boli"/>
+        <a:font script="Deva" typeface="Mangal"/>
+        <a:font script="Telu" typeface="Gautami"/>
+        <a:font script="Taml" typeface="Latha"/>
+        <a:font script="Syrc" typeface="Estrangelo Edessa"/>
+        <a:font script="Orya" typeface="Kalinga"/>
+        <a:font script="Mlym" typeface="Kartika"/>
+        <a:font script="Laoo" typeface="DokChampa"/>
+        <a:font script="Sinh" typeface="Iskoola Pota"/>
+        <a:font script="Mong" typeface="Mongolian Baiti"/>
+        <a:font script="Viet" typeface="Times New Roman"/>
+        <a:font script="Uigh" typeface="Microsoft Uighur"/>
+        <a:font script="Geor" typeface="Sylfaen"/>
+      </a:majorFont>
+      <a:minorFont>
+        <a:latin typeface="Arial"/>
+        <a:ea typeface=""/>
+        <a:cs typeface=""/>
+        <a:font script="Jpan" typeface="ＭＳ Ｐゴシック"/>
+        <a:font script="Hang" typeface="맑은 고딕"/>
+        <a:font script="Hans" typeface="宋体"/>
+        <a:font script="Hant" typeface="新細明體"/>
+        <a:font script="Arab" typeface="Arial"/>
+        <a:font script="Hebr" typeface="Arial"/>
+        <a:font script="Thai" typeface="Cordia New"/>
+        <a:font script="Ethi" typeface="Nyala"/>
+        <a:font script="Beng" typeface="Vrinda"/>
+        <a:font script="Gujr" typeface="Shruti"/>
+        <a:font script="Khmr" typeface="DaunPenh"/>
+        <a:font script="Knda" typeface="Tunga"/>
+        <a:font script="Guru" typeface="Raavi"/>
+        <a:font script="Cans" typeface="Euphemia"/>
+        <a:font script="Cher" typeface="Plantagenet Cherokee"/>
+        <a:font script="Yiii" typeface="Microsoft Yi Baiti"/>
+        <a:font script="Tibt" typeface="Microsoft Himalaya"/>
+        <a:font script="Thaa" typeface="MV Boli"/>
+        <a:font script="Deva" typeface="Mangal"/>
+        <a:font script="Telu" typeface="Gautami"/>
+        <a:font script="Taml" typeface="Latha"/>
+        <a:font script="Syrc" typeface="Estrangelo Edessa"/>
+        <a:font script="Orya" typeface="Kalinga"/>
+        <a:font script="Mlym" typeface="Kartika"/>
+        <a:font script="Laoo" typeface="DokChampa"/>
+        <a:font script="Sinh" typeface="Iskoola Pota"/>
+        <a:font script="Mong" typeface="Mongolian Baiti"/>
+        <a:font script="Viet" typeface="Arial"/>
+        <a:font script="Uigh" typeface="Microsoft Uighur"/>
+        <a:font script="Geor" typeface="Sylfaen"/>
+      </a:minorFont>
+    </a:fontScheme>
+    <a:fmtScheme name="Office">
+      <a:fillStyleLst>
+        <a:solidFill>
+          <a:schemeClr val="phClr"/>
+        </a:solidFill>
+        <a:gradFill rotWithShape="1">
+          <a:gsLst>
+            <a:gs pos="0">
+              <a:schemeClr val="phClr">
+                <a:tint val="50000"/>
+                <a:satMod val="300000"/>
+              </a:schemeClr>
+            </a:gs>
+            <a:gs pos="35000">
+              <a:schemeClr val="phClr">
+                <a:tint val="37000"/>
+                <a:satMod val="300000"/>
+              </a:schemeClr>
+            </a:gs>
+            <a:gs pos="100000">
+              <a:schemeClr val="phClr">
+                <a:tint val="15000"/>
+                <a:satMod val="350000"/>
+              </a:schemeClr>
+            </a:gs>
+          </a:gsLst>
+          <a:lin ang="16200000" scaled="1"/>
+        </a:gradFill>
+        <a:gradFill rotWithShape="1">
+          <a:gsLst>
+            <a:gs pos="0">
+              <a:schemeClr val="phClr">
+                <a:tint val="100000"/>
+                <a:shade val="100000"/>
+                <a:satMod val="130000"/>
+              </a:schemeClr>
+            </a:gs>
+            <a:gs pos="100000">
+              <a:schemeClr val="phClr">
+                <a:tint val="50000"/>
+                <a:shade val="100000"/>
+                <a:satMod val="350000"/>
+              </a:schemeClr>
+            </a:gs>
+          </a:gsLst>
+          <a:lin ang="16200000" scaled="0"/>
+        </a:gradFill>
+      </a:fillStyleLst>
+      <a:lnStyleLst>
+        <a:ln w="9525" cap="flat" cmpd="sng" algn="ctr">
+          <a:solidFill>
+            <a:schemeClr val="phClr">
+              <a:shade val="95000"/>
+              <a:satMod val="105000"/>
+            </a:schemeClr>
+          </a:solidFill>
+          <a:prstDash val="solid"/>
+        </a:ln>
+        <a:ln w="25400" cap="flat" cmpd="sng" algn="ctr">
+          <a:solidFill>
+            <a:schemeClr val="phClr"/>
+          </a:solidFill>
+          <a:prstDash val="solid"/>
+        </a:ln>
+        <a:ln w="38100" cap="flat" cmpd="sng" algn="ctr">
+          <a:solidFill>
+            <a:schemeClr val="phClr"/>
+          </a:solidFill>
+          <a:prstDash val="solid"/>
+        </a:ln>
+      </a:lnStyleLst>
+      <a:effectStyleLst>
+        <a:effectStyle>
+          <a:effectLst>
+            <a:outerShdw blurRad="40000" dist="20000" dir="5400000" rotWithShape="0">
+              <a:srgbClr val="000000">
+                <a:alpha val="38000"/>
+              </a:srgbClr>
+            </a:outerShdw>
+          </a:effectLst>
+        </a:effectStyle>
+        <a:effectStyle>
+          <a:effectLst>
+            <a:outerShdw blurRad="40000" dist="23000" dir="5400000" rotWithShape="0">
+              <a:srgbClr val="000000">
+                <a:alpha val="35000"/>
+              </a:srgbClr>
+            </a:outerShdw>
+          </a:effectLst>
+        </a:effectStyle>
+        <a:effectStyle>
+          <a:effectLst>
+            <a:outerShdw blurRad="40000" dist="23000" dir="5400000" rotWithShape="0">
+              <a:srgbClr val="000000">
+                <a:alpha val="35000"/>
+              </a:srgbClr>
+            </a:outerShdw>
+          </a:effectLst>
+          <a:scene3d>
+            <a:camera prst="orthographicFront">
+              <a:rot lat="0" lon="0" rev="0"/>
+            </a:camera>
+            <a:lightRig rig="threePt" dir="t">
+              <a:rot lat="0" lon="0" rev="1200000"/>
+            </a:lightRig>
+          </a:scene3d>
+          <a:sp3d>
+            <a:bevelT w="63500" h="25400"/>
+          </a:sp3d>
+        </a:effectStyle>
+      </a:effectStyleLst>
+      <a:bgFillStyleLst>
+        <a:solidFill>
+          <a:schemeClr val="phClr"/>
+        </a:solidFill>
+        <a:gradFill rotWithShape="1">
+          <a:gsLst>
+            <a:gs pos="0">
+              <a:schemeClr val="phClr">
+                <a:tint val="40000"/>
+                <a:satMod val="350000"/>
+              </a:schemeClr>
+            </a:gs>
+            <a:gs pos="40000">
+              <a:schemeClr val="phClr">
+                <a:tint val="45000"/>
+                <a:shade val="99000"/>
+                <a:satMod val="350000"/>
+              </a:schemeClr>
+            </a:gs>
+            <a:gs pos="100000">
+              <a:schemeClr val="phClr">
+                <a:shade val="20000"/>
+                <a:satMod val="255000"/>
+              </a:schemeClr>
+            </a:gs>
+          </a:gsLst>
+          <a:path path="circle">
+            <a:fillToRect l="50000" t="-80000" r="50000" b="180000"/>
+          </a:path>
+        </a:gradFill>
+        <a:gradFill rotWithShape="1">
+          <a:gsLst>
+            <a:gs pos="0">
+              <a:schemeClr val="phClr">
+                <a:tint val="80000"/>
+                <a:satMod val="300000"/>
+              </a:schemeClr>
+            </a:gs>
+            <a:gs pos="100000">
+              <a:schemeClr val="phClr">
+                <a:shade val="30000"/>
+                <a:satMod val="200000"/>
+              </a:schemeClr>
+            </a:gs>
+          </a:gsLst>
+          <a:path path="circle">
+            <a:fillToRect l="50000" t="50000" r="50000" b="50000"/>
+          </a:path>
+        </a:gradFill>
+      </a:bgFillStyleLst>
+    </a:fmtScheme>
+  </a:themeElements>
+</a:theme>
 </file>
 
-<file path=ppt/slides/slide9.xml><?xml version="1.0" encoding="utf-8"?>
-<p:sld xmlns:a="http://schemas.openxmlformats.org/drawingml/2006/main" xmlns:r="http://schemas.openxmlformats.org/officeDocument/2006/relationships" xmlns:mc="http://schemas.openxmlformats.org/markup-compatibility/2006" xmlns:mv="urn:schemas-microsoft-com:mac:vml" xmlns:p="http://schemas.openxmlformats.org/presentationml/2006/main" xmlns:c="http://schemas.openxmlformats.org/drawingml/2006/chart" xmlns:dgm="http://schemas.openxmlformats.org/drawingml/2006/diagram" xmlns:o="urn:schemas-microsoft-com:office:office" xmlns:v="urn:schemas-microsoft-com:vml" xmlns:pvml="urn:schemas-microsoft-com:office:powerpoint" xmlns:com="http://schemas.openxmlformats.org/drawingml/2006/compatibility" xmlns:p14="http://schemas.microsoft.com/office/powerpoint/2010/main" xmlns:p15="http://schemas.microsoft.com/office/powerpoint/2012/main" xmlns:ahyp="http://schemas.microsoft.com/office/drawing/2018/hyperlinkcolor">
-  <p:cSld>
-    <p:spTree>
-      <p:nvGrpSpPr>
-        <p:cNvPr id="286" name="Shape 286"/>
-        <p:cNvGrpSpPr/>
-        <p:nvPr/>
-      </p:nvGrpSpPr>
-      <p:grpSpPr>
-        <a:xfrm>
-          <a:off x="0" y="0"/>
-          <a:ext cx="0" cy="0"/>
-          <a:chOff x="0" y="0"/>
-          <a:chExt cx="0" cy="0"/>
-        </a:xfrm>
-      </p:grpSpPr>
-      <p:sp>
-        <p:nvSpPr>
-          <p:cNvPr id="287" name="Google Shape;287;p31"/>
-          <p:cNvSpPr txBox="1"/>
-          <p:nvPr>
-            <p:ph type="title"/>
-          </p:nvPr>
-        </p:nvSpPr>
-        <p:spPr>
-          <a:xfrm>
-            <a:off x="1494150" y="451575"/>
-            <a:ext cx="6155700" cy="664200"/>
-          </a:xfrm>
-          <a:prstGeom prst="rect">
-            <a:avLst/>
-          </a:prstGeom>
-        </p:spPr>
-        <p:txBody>
-          <a:bodyPr anchorCtr="0" anchor="t" bIns="91425" lIns="91425" spcFirstLastPara="1" rIns="91425" wrap="square" tIns="91425">
-            <a:noAutofit/>
-          </a:bodyPr>
-          <a:lstStyle/>
-          <a:p>
-            <a:pPr indent="0" lvl="0" marL="0" rtl="0" algn="l">
-              <a:spcBef>
-                <a:spcPts val="0"/>
-              </a:spcBef>
-              <a:spcAft>
-                <a:spcPts val="0"/>
-              </a:spcAft>
-              <a:buNone/>
-            </a:pPr>
-            <a:r>
-              <a:rPr lang="en"/>
-              <a:t>Kas notika, pēc koda palaišanas</a:t>
-            </a:r>
-            <a:endParaRPr/>
-          </a:p>
-        </p:txBody>
-      </p:sp>
-      <p:sp>
-        <p:nvSpPr>
-          <p:cNvPr id="288" name="Google Shape;288;p31"/>
-          <p:cNvSpPr txBox="1"/>
-          <p:nvPr/>
-        </p:nvSpPr>
-        <p:spPr>
-          <a:xfrm>
-            <a:off x="1696000" y="1195238"/>
-            <a:ext cx="1134300" cy="554100"/>
-          </a:xfrm>
-          <a:prstGeom prst="rect">
-            <a:avLst/>
-          </a:prstGeom>
-          <a:noFill/>
-          <a:ln>
-            <a:noFill/>
-          </a:ln>
-        </p:spPr>
-        <p:txBody>
-          <a:bodyPr anchorCtr="0" anchor="t" bIns="91425" lIns="91425" spcFirstLastPara="1" rIns="91425" wrap="square" tIns="91425">
-            <a:spAutoFit/>
-          </a:bodyPr>
-          <a:lstStyle/>
-          <a:p>
-            <a:pPr indent="0" lvl="0" marL="0" rtl="0" algn="l">
-              <a:spcBef>
-                <a:spcPts val="0"/>
-              </a:spcBef>
-              <a:spcAft>
-                <a:spcPts val="0"/>
-              </a:spcAft>
-              <a:buNone/>
-            </a:pPr>
-            <a:r>
-              <a:rPr lang="en" sz="2400">
-                <a:solidFill>
-                  <a:schemeClr val="dk2"/>
-                </a:solidFill>
-                <a:latin typeface="Albert Sans"/>
-                <a:ea typeface="Albert Sans"/>
-                <a:cs typeface="Albert Sans"/>
-                <a:sym typeface="Albert Sans"/>
-              </a:rPr>
-              <a:t>Pirms:</a:t>
-            </a:r>
-            <a:endParaRPr sz="2400">
-              <a:solidFill>
-                <a:schemeClr val="dk2"/>
-              </a:solidFill>
-              <a:latin typeface="Albert Sans"/>
-              <a:ea typeface="Albert Sans"/>
-              <a:cs typeface="Albert Sans"/>
-              <a:sym typeface="Albert Sans"/>
-            </a:endParaRPr>
-          </a:p>
-        </p:txBody>
-      </p:sp>
-      <p:sp>
-        <p:nvSpPr>
-          <p:cNvPr id="289" name="Google Shape;289;p31"/>
-          <p:cNvSpPr txBox="1"/>
-          <p:nvPr/>
-        </p:nvSpPr>
-        <p:spPr>
-          <a:xfrm>
-            <a:off x="5668175" y="1195250"/>
-            <a:ext cx="811800" cy="554100"/>
-          </a:xfrm>
-          <a:prstGeom prst="rect">
-            <a:avLst/>
-          </a:prstGeom>
-          <a:noFill/>
-          <a:ln>
-            <a:noFill/>
-          </a:ln>
-        </p:spPr>
-        <p:txBody>
-          <a:bodyPr anchorCtr="0" anchor="t" bIns="91425" lIns="91425" spcFirstLastPara="1" rIns="91425" wrap="square" tIns="91425">
-            <a:spAutoFit/>
-          </a:bodyPr>
-          <a:lstStyle/>
-          <a:p>
-            <a:pPr indent="0" lvl="0" marL="0" rtl="0" algn="l">
-              <a:spcBef>
-                <a:spcPts val="0"/>
-              </a:spcBef>
-              <a:spcAft>
-                <a:spcPts val="0"/>
-              </a:spcAft>
-              <a:buNone/>
-            </a:pPr>
-            <a:r>
-              <a:rPr lang="en" sz="2400">
-                <a:solidFill>
-                  <a:schemeClr val="dk2"/>
-                </a:solidFill>
-                <a:latin typeface="Albert Sans"/>
-                <a:ea typeface="Albert Sans"/>
-                <a:cs typeface="Albert Sans"/>
-                <a:sym typeface="Albert Sans"/>
-              </a:rPr>
-              <a:t>Pēc:</a:t>
-            </a:r>
-            <a:endParaRPr sz="2400">
-              <a:solidFill>
-                <a:schemeClr val="dk2"/>
-              </a:solidFill>
-              <a:latin typeface="Albert Sans"/>
-              <a:ea typeface="Albert Sans"/>
-              <a:cs typeface="Albert Sans"/>
-              <a:sym typeface="Albert Sans"/>
-            </a:endParaRPr>
-          </a:p>
-        </p:txBody>
-      </p:sp>
-      <p:pic>
-        <p:nvPicPr>
-          <p:cNvPr id="290" name="Google Shape;290;p31"/>
-          <p:cNvPicPr preferRelativeResize="0"/>
-          <p:nvPr/>
-        </p:nvPicPr>
-        <p:blipFill>
-          <a:blip r:embed="rId3">
-            <a:alphaModFix/>
-          </a:blip>
-          <a:stretch>
-            <a:fillRect/>
-          </a:stretch>
-        </p:blipFill>
-        <p:spPr>
-          <a:xfrm>
-            <a:off x="985000" y="1749356"/>
-            <a:ext cx="2556300" cy="1493550"/>
-          </a:xfrm>
-          <a:prstGeom prst="rect">
-            <a:avLst/>
-          </a:prstGeom>
-          <a:noFill/>
-          <a:ln>
-            <a:noFill/>
-          </a:ln>
-        </p:spPr>
-      </p:pic>
-      <p:pic>
-        <p:nvPicPr>
-          <p:cNvPr id="291" name="Google Shape;291;p31"/>
-          <p:cNvPicPr preferRelativeResize="0"/>
-          <p:nvPr/>
-        </p:nvPicPr>
-        <p:blipFill>
-          <a:blip r:embed="rId4">
-            <a:alphaModFix/>
-          </a:blip>
-          <a:stretch>
-            <a:fillRect/>
-          </a:stretch>
-        </p:blipFill>
-        <p:spPr>
-          <a:xfrm>
-            <a:off x="5068575" y="1749353"/>
-            <a:ext cx="2011000" cy="1493550"/>
-          </a:xfrm>
-          <a:prstGeom prst="rect">
-            <a:avLst/>
-          </a:prstGeom>
-          <a:noFill/>
-          <a:ln>
-            <a:noFill/>
-          </a:ln>
-        </p:spPr>
-      </p:pic>
-      <p:pic>
-        <p:nvPicPr>
-          <p:cNvPr id="292" name="Google Shape;292;p31"/>
-          <p:cNvPicPr preferRelativeResize="0"/>
-          <p:nvPr/>
-        </p:nvPicPr>
-        <p:blipFill>
-          <a:blip r:embed="rId5">
-            <a:alphaModFix/>
-          </a:blip>
-          <a:stretch>
-            <a:fillRect/>
-          </a:stretch>
-        </p:blipFill>
-        <p:spPr>
-          <a:xfrm>
-            <a:off x="4235750" y="3575931"/>
-            <a:ext cx="3676650" cy="504825"/>
-          </a:xfrm>
-          <a:prstGeom prst="rect">
-            <a:avLst/>
-          </a:prstGeom>
-          <a:noFill/>
-          <a:ln>
-            <a:noFill/>
-          </a:ln>
-        </p:spPr>
-      </p:pic>
-    </p:spTree>
-  </p:cSld>
-  <p:clrMapOvr>
-    <a:masterClrMapping/>
-  </p:clrMapOvr>
-</p:sld>
-</file>
-
-<file path=ppt/theme/theme1.xml><?xml version="1.0" encoding="utf-8"?>
+<file path=ppt/theme/theme2.xml><?xml version="1.0" encoding="utf-8"?>
 <a:theme xmlns:a="http://schemas.openxmlformats.org/drawingml/2006/main" xmlns:r="http://schemas.openxmlformats.org/officeDocument/2006/relationships">
   <a:themeElements>
     <a:clrScheme name="Default">
@@ -30516,283 +31157,4 @@
     </a:fmtScheme>
   </a:themeElements>
 </a:theme>
-</file>
-
-<file path=ppt/theme/theme2.xml><?xml version="1.0" encoding="utf-8"?>
-<a:theme xmlns:a="http://schemas.openxmlformats.org/drawingml/2006/main" xmlns:r="http://schemas.openxmlformats.org/officeDocument/2006/relationships" name="AI Incident Automation Pitch Deck by Slidesgo">
-  <a:themeElements>
-    <a:clrScheme name="Simple Light">
-      <a:dk1>
-        <a:srgbClr val="012169"/>
-      </a:dk1>
-      <a:lt1>
-        <a:srgbClr val="0048A7"/>
-      </a:lt1>
-      <a:dk2>
-        <a:srgbClr val="0388E5"/>
-      </a:dk2>
-      <a:lt2>
-        <a:srgbClr val="3ED4FD"/>
-      </a:lt2>
-      <a:accent1>
-        <a:srgbClr val="DAF2FE"/>
-      </a:accent1>
-      <a:accent2>
-        <a:srgbClr val="6746B9"/>
-      </a:accent2>
-      <a:accent3>
-        <a:srgbClr val="AD8DFF"/>
-      </a:accent3>
-      <a:accent4>
-        <a:srgbClr val="FFFFFF"/>
-      </a:accent4>
-      <a:accent5>
-        <a:srgbClr val="FFFFFF"/>
-      </a:accent5>
-      <a:accent6>
-        <a:srgbClr val="FFFFFF"/>
-      </a:accent6>
-      <a:hlink>
-        <a:srgbClr val="012169"/>
-      </a:hlink>
-      <a:folHlink>
-        <a:srgbClr val="0097A7"/>
-      </a:folHlink>
-    </a:clrScheme>
-    <a:fontScheme name="Office">
-      <a:majorFont>
-        <a:latin typeface="Arial"/>
-        <a:ea typeface=""/>
-        <a:cs typeface=""/>
-        <a:font script="Jpan" typeface="ＭＳ Ｐゴシック"/>
-        <a:font script="Hang" typeface="맑은 고딕"/>
-        <a:font script="Hans" typeface="宋体"/>
-        <a:font script="Hant" typeface="新細明體"/>
-        <a:font script="Arab" typeface="Times New Roman"/>
-        <a:font script="Hebr" typeface="Times New Roman"/>
-        <a:font script="Thai" typeface="Angsana New"/>
-        <a:font script="Ethi" typeface="Nyala"/>
-        <a:font script="Beng" typeface="Vrinda"/>
-        <a:font script="Gujr" typeface="Shruti"/>
-        <a:font script="Khmr" typeface="MoolBoran"/>
-        <a:font script="Knda" typeface="Tunga"/>
-        <a:font script="Guru" typeface="Raavi"/>
-        <a:font script="Cans" typeface="Euphemia"/>
-        <a:font script="Cher" typeface="Plantagenet Cherokee"/>
-        <a:font script="Yiii" typeface="Microsoft Yi Baiti"/>
-        <a:font script="Tibt" typeface="Microsoft Himalaya"/>
-        <a:font script="Thaa" typeface="MV Boli"/>
-        <a:font script="Deva" typeface="Mangal"/>
-        <a:font script="Telu" typeface="Gautami"/>
-        <a:font script="Taml" typeface="Latha"/>
-        <a:font script="Syrc" typeface="Estrangelo Edessa"/>
-        <a:font script="Orya" typeface="Kalinga"/>
-        <a:font script="Mlym" typeface="Kartika"/>
-        <a:font script="Laoo" typeface="DokChampa"/>
-        <a:font script="Sinh" typeface="Iskoola Pota"/>
-        <a:font script="Mong" typeface="Mongolian Baiti"/>
-        <a:font script="Viet" typeface="Times New Roman"/>
-        <a:font script="Uigh" typeface="Microsoft Uighur"/>
-        <a:font script="Geor" typeface="Sylfaen"/>
-      </a:majorFont>
-      <a:minorFont>
-        <a:latin typeface="Arial"/>
-        <a:ea typeface=""/>
-        <a:cs typeface=""/>
-        <a:font script="Jpan" typeface="ＭＳ Ｐゴシック"/>
-        <a:font script="Hang" typeface="맑은 고딕"/>
-        <a:font script="Hans" typeface="宋体"/>
-        <a:font script="Hant" typeface="新細明體"/>
-        <a:font script="Arab" typeface="Arial"/>
-        <a:font script="Hebr" typeface="Arial"/>
-        <a:font script="Thai" typeface="Cordia New"/>
-        <a:font script="Ethi" typeface="Nyala"/>
-        <a:font script="Beng" typeface="Vrinda"/>
-        <a:font script="Gujr" typeface="Shruti"/>
-        <a:font script="Khmr" typeface="DaunPenh"/>
-        <a:font script="Knda" typeface="Tunga"/>
-        <a:font script="Guru" typeface="Raavi"/>
-        <a:font script="Cans" typeface="Euphemia"/>
-        <a:font script="Cher" typeface="Plantagenet Cherokee"/>
-        <a:font script="Yiii" typeface="Microsoft Yi Baiti"/>
-        <a:font script="Tibt" typeface="Microsoft Himalaya"/>
-        <a:font script="Thaa" typeface="MV Boli"/>
-        <a:font script="Deva" typeface="Mangal"/>
-        <a:font script="Telu" typeface="Gautami"/>
-        <a:font script="Taml" typeface="Latha"/>
-        <a:font script="Syrc" typeface="Estrangelo Edessa"/>
-        <a:font script="Orya" typeface="Kalinga"/>
-        <a:font script="Mlym" typeface="Kartika"/>
-        <a:font script="Laoo" typeface="DokChampa"/>
-        <a:font script="Sinh" typeface="Iskoola Pota"/>
-        <a:font script="Mong" typeface="Mongolian Baiti"/>
-        <a:font script="Viet" typeface="Arial"/>
-        <a:font script="Uigh" typeface="Microsoft Uighur"/>
-        <a:font script="Geor" typeface="Sylfaen"/>
-      </a:minorFont>
-    </a:fontScheme>
-    <a:fmtScheme name="Office">
-      <a:fillStyleLst>
-        <a:solidFill>
-          <a:schemeClr val="phClr"/>
-        </a:solidFill>
-        <a:gradFill rotWithShape="1">
-          <a:gsLst>
-            <a:gs pos="0">
-              <a:schemeClr val="phClr">
-                <a:tint val="50000"/>
-                <a:satMod val="300000"/>
-              </a:schemeClr>
-            </a:gs>
-            <a:gs pos="35000">
-              <a:schemeClr val="phClr">
-                <a:tint val="37000"/>
-                <a:satMod val="300000"/>
-              </a:schemeClr>
-            </a:gs>
-            <a:gs pos="100000">
-              <a:schemeClr val="phClr">
-                <a:tint val="15000"/>
-                <a:satMod val="350000"/>
-              </a:schemeClr>
-            </a:gs>
-          </a:gsLst>
-          <a:lin ang="16200000" scaled="1"/>
-        </a:gradFill>
-        <a:gradFill rotWithShape="1">
-          <a:gsLst>
-            <a:gs pos="0">
-              <a:schemeClr val="phClr">
-                <a:tint val="100000"/>
-                <a:shade val="100000"/>
-                <a:satMod val="130000"/>
-              </a:schemeClr>
-            </a:gs>
-            <a:gs pos="100000">
-              <a:schemeClr val="phClr">
-                <a:tint val="50000"/>
-                <a:shade val="100000"/>
-                <a:satMod val="350000"/>
-              </a:schemeClr>
-            </a:gs>
-          </a:gsLst>
-          <a:lin ang="16200000" scaled="0"/>
-        </a:gradFill>
-      </a:fillStyleLst>
-      <a:lnStyleLst>
-        <a:ln w="9525" cap="flat" cmpd="sng" algn="ctr">
-          <a:solidFill>
-            <a:schemeClr val="phClr">
-              <a:shade val="95000"/>
-              <a:satMod val="105000"/>
-            </a:schemeClr>
-          </a:solidFill>
-          <a:prstDash val="solid"/>
-        </a:ln>
-        <a:ln w="25400" cap="flat" cmpd="sng" algn="ctr">
-          <a:solidFill>
-            <a:schemeClr val="phClr"/>
-          </a:solidFill>
-          <a:prstDash val="solid"/>
-        </a:ln>
-        <a:ln w="38100" cap="flat" cmpd="sng" algn="ctr">
-          <a:solidFill>
-            <a:schemeClr val="phClr"/>
-          </a:solidFill>
-          <a:prstDash val="solid"/>
-        </a:ln>
-      </a:lnStyleLst>
-      <a:effectStyleLst>
-        <a:effectStyle>
-          <a:effectLst>
-            <a:outerShdw blurRad="40000" dist="20000" dir="5400000" rotWithShape="0">
-              <a:srgbClr val="000000">
-                <a:alpha val="38000"/>
-              </a:srgbClr>
-            </a:outerShdw>
-          </a:effectLst>
-        </a:effectStyle>
-        <a:effectStyle>
-          <a:effectLst>
-            <a:outerShdw blurRad="40000" dist="23000" dir="5400000" rotWithShape="0">
-              <a:srgbClr val="000000">
-                <a:alpha val="35000"/>
-              </a:srgbClr>
-            </a:outerShdw>
-          </a:effectLst>
-        </a:effectStyle>
-        <a:effectStyle>
-          <a:effectLst>
-            <a:outerShdw blurRad="40000" dist="23000" dir="5400000" rotWithShape="0">
-              <a:srgbClr val="000000">
-                <a:alpha val="35000"/>
-              </a:srgbClr>
-            </a:outerShdw>
-          </a:effectLst>
-          <a:scene3d>
-            <a:camera prst="orthographicFront">
-              <a:rot lat="0" lon="0" rev="0"/>
-            </a:camera>
-            <a:lightRig rig="threePt" dir="t">
-              <a:rot lat="0" lon="0" rev="1200000"/>
-            </a:lightRig>
-          </a:scene3d>
-          <a:sp3d>
-            <a:bevelT w="63500" h="25400"/>
-          </a:sp3d>
-        </a:effectStyle>
-      </a:effectStyleLst>
-      <a:bgFillStyleLst>
-        <a:solidFill>
-          <a:schemeClr val="phClr"/>
-        </a:solidFill>
-        <a:gradFill rotWithShape="1">
-          <a:gsLst>
-            <a:gs pos="0">
-              <a:schemeClr val="phClr">
-                <a:tint val="40000"/>
-                <a:satMod val="350000"/>
-              </a:schemeClr>
-            </a:gs>
-            <a:gs pos="40000">
-              <a:schemeClr val="phClr">
-                <a:tint val="45000"/>
-                <a:shade val="99000"/>
-                <a:satMod val="350000"/>
-              </a:schemeClr>
-            </a:gs>
-            <a:gs pos="100000">
-              <a:schemeClr val="phClr">
-                <a:shade val="20000"/>
-                <a:satMod val="255000"/>
-              </a:schemeClr>
-            </a:gs>
-          </a:gsLst>
-          <a:path path="circle">
-            <a:fillToRect l="50000" t="-80000" r="50000" b="180000"/>
-          </a:path>
-        </a:gradFill>
-        <a:gradFill rotWithShape="1">
-          <a:gsLst>
-            <a:gs pos="0">
-              <a:schemeClr val="phClr">
-                <a:tint val="80000"/>
-                <a:satMod val="300000"/>
-              </a:schemeClr>
-            </a:gs>
-            <a:gs pos="100000">
-              <a:schemeClr val="phClr">
-                <a:shade val="30000"/>
-                <a:satMod val="200000"/>
-              </a:schemeClr>
-            </a:gs>
-          </a:gsLst>
-          <a:path path="circle">
-            <a:fillToRect l="50000" t="50000" r="50000" b="50000"/>
-          </a:path>
-        </a:gradFill>
-      </a:bgFillStyleLst>
-    </a:fmtScheme>
-  </a:themeElements>
-</a:theme>
 </file>
</xml_diff>